<commit_message>
everything but code and viz screenshots for RF on neutral
</commit_message>
<xml_diff>
--- a/slides/slides_polishing.pptx
+++ b/slides/slides_polishing.pptx
@@ -5,7 +5,7 @@
     <p:sldMasterId id="2147483648" r:id="rId1"/>
   </p:sldMasterIdLst>
   <p:notesMasterIdLst>
-    <p:notesMasterId r:id="rId56"/>
+    <p:notesMasterId r:id="rId69"/>
   </p:notesMasterIdLst>
   <p:sldIdLst>
     <p:sldId id="256" r:id="rId2"/>
@@ -56,12 +56,25 @@
     <p:sldId id="340" r:id="rId47"/>
     <p:sldId id="341" r:id="rId48"/>
     <p:sldId id="270" r:id="rId49"/>
-    <p:sldId id="271" r:id="rId50"/>
-    <p:sldId id="272" r:id="rId51"/>
-    <p:sldId id="273" r:id="rId52"/>
-    <p:sldId id="274" r:id="rId53"/>
-    <p:sldId id="275" r:id="rId54"/>
-    <p:sldId id="276" r:id="rId55"/>
+    <p:sldId id="342" r:id="rId50"/>
+    <p:sldId id="343" r:id="rId51"/>
+    <p:sldId id="344" r:id="rId52"/>
+    <p:sldId id="347" r:id="rId53"/>
+    <p:sldId id="348" r:id="rId54"/>
+    <p:sldId id="345" r:id="rId55"/>
+    <p:sldId id="349" r:id="rId56"/>
+    <p:sldId id="350" r:id="rId57"/>
+    <p:sldId id="351" r:id="rId58"/>
+    <p:sldId id="352" r:id="rId59"/>
+    <p:sldId id="356" r:id="rId60"/>
+    <p:sldId id="353" r:id="rId61"/>
+    <p:sldId id="355" r:id="rId62"/>
+    <p:sldId id="354" r:id="rId63"/>
+    <p:sldId id="357" r:id="rId64"/>
+    <p:sldId id="358" r:id="rId65"/>
+    <p:sldId id="359" r:id="rId66"/>
+    <p:sldId id="360" r:id="rId67"/>
+    <p:sldId id="361" r:id="rId68"/>
   </p:sldIdLst>
   <p:sldSz cx="9144000" cy="5143500" type="screen16x9"/>
   <p:notesSz cx="6858000" cy="9144000"/>
@@ -16385,8 +16398,8 @@
           </p:spPr>
         </p:pic>
       </p:grpSp>
-      <mc:AlternateContent xmlns:mc="http://schemas.openxmlformats.org/markup-compatibility/2006">
-        <mc:Choice xmlns:a14="http://schemas.microsoft.com/office/drawing/2010/main" Requires="a14">
+      <mc:AlternateContent xmlns:mc="http://schemas.openxmlformats.org/markup-compatibility/2006" xmlns:a14="http://schemas.microsoft.com/office/drawing/2010/main">
+        <mc:Choice Requires="a14">
           <p:sp>
             <p:nvSpPr>
               <p:cNvPr id="3" name="TextBox 2">
@@ -16463,7 +16476,7 @@
             </p:txBody>
           </p:sp>
         </mc:Choice>
-        <mc:Fallback>
+        <mc:Fallback xmlns="">
           <p:sp>
             <p:nvSpPr>
               <p:cNvPr id="3" name="TextBox 2">
@@ -17636,8 +17649,8 @@
           </a:prstGeom>
         </p:spPr>
       </p:pic>
-      <mc:AlternateContent xmlns:mc="http://schemas.openxmlformats.org/markup-compatibility/2006">
-        <mc:Choice xmlns:a14="http://schemas.microsoft.com/office/drawing/2010/main" Requires="a14">
+      <mc:AlternateContent xmlns:mc="http://schemas.openxmlformats.org/markup-compatibility/2006" xmlns:a14="http://schemas.microsoft.com/office/drawing/2010/main">
+        <mc:Choice Requires="a14">
           <p:sp>
             <p:nvSpPr>
               <p:cNvPr id="14" name="TextBox 13">
@@ -17714,7 +17727,7 @@
             </p:txBody>
           </p:sp>
         </mc:Choice>
-        <mc:Fallback>
+        <mc:Fallback xmlns="">
           <p:sp>
             <p:nvSpPr>
               <p:cNvPr id="14" name="TextBox 13">
@@ -18986,8 +18999,8 @@
           </a:prstGeom>
         </p:spPr>
       </p:pic>
-      <mc:AlternateContent xmlns:mc="http://schemas.openxmlformats.org/markup-compatibility/2006">
-        <mc:Choice xmlns:a14="http://schemas.microsoft.com/office/drawing/2010/main" Requires="a14">
+      <mc:AlternateContent xmlns:mc="http://schemas.openxmlformats.org/markup-compatibility/2006" xmlns:a14="http://schemas.microsoft.com/office/drawing/2010/main">
+        <mc:Choice Requires="a14">
           <p:sp>
             <p:nvSpPr>
               <p:cNvPr id="13" name="TextBox 12">
@@ -19064,7 +19077,7 @@
             </p:txBody>
           </p:sp>
         </mc:Choice>
-        <mc:Fallback>
+        <mc:Fallback xmlns="">
           <p:sp>
             <p:nvSpPr>
               <p:cNvPr id="13" name="TextBox 12">
@@ -20477,8 +20490,8 @@
           </a:prstGeom>
         </p:spPr>
       </p:pic>
-      <mc:AlternateContent xmlns:mc="http://schemas.openxmlformats.org/markup-compatibility/2006">
-        <mc:Choice xmlns:a14="http://schemas.microsoft.com/office/drawing/2010/main" Requires="a14">
+      <mc:AlternateContent xmlns:mc="http://schemas.openxmlformats.org/markup-compatibility/2006" xmlns:a14="http://schemas.microsoft.com/office/drawing/2010/main">
+        <mc:Choice Requires="a14">
           <p:sp>
             <p:nvSpPr>
               <p:cNvPr id="26" name="TextBox 25">
@@ -20555,7 +20568,7 @@
             </p:txBody>
           </p:sp>
         </mc:Choice>
-        <mc:Fallback>
+        <mc:Fallback xmlns="">
           <p:sp>
             <p:nvSpPr>
               <p:cNvPr id="26" name="TextBox 25">
@@ -22057,8 +22070,8 @@
           </a:prstGeom>
         </p:spPr>
       </p:pic>
-      <mc:AlternateContent xmlns:mc="http://schemas.openxmlformats.org/markup-compatibility/2006">
-        <mc:Choice xmlns:a14="http://schemas.microsoft.com/office/drawing/2010/main" Requires="a14">
+      <mc:AlternateContent xmlns:mc="http://schemas.openxmlformats.org/markup-compatibility/2006" xmlns:a14="http://schemas.microsoft.com/office/drawing/2010/main">
+        <mc:Choice Requires="a14">
           <p:sp>
             <p:nvSpPr>
               <p:cNvPr id="28" name="TextBox 27">
@@ -22135,7 +22148,7 @@
             </p:txBody>
           </p:sp>
         </mc:Choice>
-        <mc:Fallback>
+        <mc:Fallback xmlns="">
           <p:sp>
             <p:nvSpPr>
               <p:cNvPr id="28" name="TextBox 27">
@@ -23886,8 +23899,8 @@
           </a:prstGeom>
         </p:spPr>
       </p:pic>
-      <mc:AlternateContent xmlns:mc="http://schemas.openxmlformats.org/markup-compatibility/2006">
-        <mc:Choice xmlns:a14="http://schemas.microsoft.com/office/drawing/2010/main" Requires="a14">
+      <mc:AlternateContent xmlns:mc="http://schemas.openxmlformats.org/markup-compatibility/2006" xmlns:a14="http://schemas.microsoft.com/office/drawing/2010/main">
+        <mc:Choice Requires="a14">
           <p:sp>
             <p:nvSpPr>
               <p:cNvPr id="24" name="TextBox 23">
@@ -23964,7 +23977,7 @@
             </p:txBody>
           </p:sp>
         </mc:Choice>
-        <mc:Fallback>
+        <mc:Fallback xmlns="">
           <p:sp>
             <p:nvSpPr>
               <p:cNvPr id="24" name="TextBox 23">
@@ -25773,8 +25786,8 @@
           </a:p>
         </p:txBody>
       </p:sp>
-      <mc:AlternateContent xmlns:mc="http://schemas.openxmlformats.org/markup-compatibility/2006">
-        <mc:Choice xmlns:a14="http://schemas.microsoft.com/office/drawing/2010/main" Requires="a14">
+      <mc:AlternateContent xmlns:mc="http://schemas.openxmlformats.org/markup-compatibility/2006" xmlns:a14="http://schemas.microsoft.com/office/drawing/2010/main">
+        <mc:Choice Requires="a14">
           <p:sp>
             <p:nvSpPr>
               <p:cNvPr id="33" name="TextBox 32">
@@ -25851,7 +25864,7 @@
             </p:txBody>
           </p:sp>
         </mc:Choice>
-        <mc:Fallback>
+        <mc:Fallback xmlns="">
           <p:sp>
             <p:nvSpPr>
               <p:cNvPr id="33" name="TextBox 32">
@@ -27632,8 +27645,8 @@
           </a:p>
         </p:txBody>
       </p:sp>
-      <mc:AlternateContent xmlns:mc="http://schemas.openxmlformats.org/markup-compatibility/2006">
-        <mc:Choice xmlns:a14="http://schemas.microsoft.com/office/drawing/2010/main" Requires="a14">
+      <mc:AlternateContent xmlns:mc="http://schemas.openxmlformats.org/markup-compatibility/2006" xmlns:a14="http://schemas.microsoft.com/office/drawing/2010/main">
+        <mc:Choice Requires="a14">
           <p:sp>
             <p:nvSpPr>
               <p:cNvPr id="33" name="TextBox 32">
@@ -27710,7 +27723,7 @@
             </p:txBody>
           </p:sp>
         </mc:Choice>
-        <mc:Fallback>
+        <mc:Fallback xmlns="">
           <p:sp>
             <p:nvSpPr>
               <p:cNvPr id="33" name="TextBox 32">
@@ -29331,8 +29344,8 @@
           </a:p>
         </p:txBody>
       </p:sp>
-      <mc:AlternateContent xmlns:mc="http://schemas.openxmlformats.org/markup-compatibility/2006">
-        <mc:Choice xmlns:a14="http://schemas.microsoft.com/office/drawing/2010/main" Requires="a14">
+      <mc:AlternateContent xmlns:mc="http://schemas.openxmlformats.org/markup-compatibility/2006" xmlns:a14="http://schemas.microsoft.com/office/drawing/2010/main">
+        <mc:Choice Requires="a14">
           <p:sp>
             <p:nvSpPr>
               <p:cNvPr id="30" name="TextBox 29">
@@ -29409,7 +29422,7 @@
             </p:txBody>
           </p:sp>
         </mc:Choice>
-        <mc:Fallback>
+        <mc:Fallback xmlns="">
           <p:sp>
             <p:nvSpPr>
               <p:cNvPr id="30" name="TextBox 29">
@@ -30613,8 +30626,8 @@
           </a:p>
         </p:txBody>
       </p:sp>
-      <mc:AlternateContent xmlns:mc="http://schemas.openxmlformats.org/markup-compatibility/2006">
-        <mc:Choice xmlns:a14="http://schemas.microsoft.com/office/drawing/2010/main" Requires="a14">
+      <mc:AlternateContent xmlns:mc="http://schemas.openxmlformats.org/markup-compatibility/2006" xmlns:a14="http://schemas.microsoft.com/office/drawing/2010/main">
+        <mc:Choice Requires="a14">
           <p:sp>
             <p:nvSpPr>
               <p:cNvPr id="5" name="TextBox 4">
@@ -30704,7 +30717,7 @@
             </p:txBody>
           </p:sp>
         </mc:Choice>
-        <mc:Fallback>
+        <mc:Fallback xmlns="">
           <p:sp>
             <p:nvSpPr>
               <p:cNvPr id="5" name="TextBox 4">
@@ -30749,8 +30762,8 @@
           </p:sp>
         </mc:Fallback>
       </mc:AlternateContent>
-      <mc:AlternateContent xmlns:mc="http://schemas.openxmlformats.org/markup-compatibility/2006">
-        <mc:Choice xmlns:a14="http://schemas.microsoft.com/office/drawing/2010/main" Requires="a14">
+      <mc:AlternateContent xmlns:mc="http://schemas.openxmlformats.org/markup-compatibility/2006" xmlns:a14="http://schemas.microsoft.com/office/drawing/2010/main">
+        <mc:Choice Requires="a14">
           <p:sp>
             <p:nvSpPr>
               <p:cNvPr id="12" name="TextBox 11">
@@ -30818,16 +30831,7 @@
                           <a:rPr lang="en-US" sz="1600" b="0" i="0" smtClean="0">
                             <a:latin typeface="Cambria Math" panose="02040503050406030204" pitchFamily="18" charset="0"/>
                           </a:rPr>
-                          <m:t>J</m:t>
-                        </m:r>
-                        <m:r>
-                          <m:rPr>
-                            <m:sty m:val="p"/>
-                          </m:rPr>
-                          <a:rPr lang="en-US" sz="1600" b="0" i="0" smtClean="0">
-                            <a:latin typeface="Cambria Math" panose="02040503050406030204" pitchFamily="18" charset="0"/>
-                          </a:rPr>
-                          <m:t>m</m:t>
+                          <m:t>Jm</m:t>
                         </m:r>
                       </m:den>
                     </m:f>
@@ -30849,7 +30853,7 @@
             </p:txBody>
           </p:sp>
         </mc:Choice>
-        <mc:Fallback>
+        <mc:Fallback xmlns="">
           <p:sp>
             <p:nvSpPr>
               <p:cNvPr id="12" name="TextBox 11">
@@ -31327,8 +31331,8 @@
           </a:prstGeom>
         </p:spPr>
       </p:pic>
-      <mc:AlternateContent xmlns:mc="http://schemas.openxmlformats.org/markup-compatibility/2006">
-        <mc:Choice xmlns:a14="http://schemas.microsoft.com/office/drawing/2010/main" Requires="a14">
+      <mc:AlternateContent xmlns:mc="http://schemas.openxmlformats.org/markup-compatibility/2006" xmlns:a14="http://schemas.microsoft.com/office/drawing/2010/main">
+        <mc:Choice Requires="a14">
           <p:sp>
             <p:nvSpPr>
               <p:cNvPr id="29" name="TextBox 28">
@@ -31405,7 +31409,7 @@
             </p:txBody>
           </p:sp>
         </mc:Choice>
-        <mc:Fallback>
+        <mc:Fallback xmlns="">
           <p:sp>
             <p:nvSpPr>
               <p:cNvPr id="29" name="TextBox 28">
@@ -32652,8 +32656,8 @@
           </a:p>
         </p:txBody>
       </p:sp>
-      <mc:AlternateContent xmlns:mc="http://schemas.openxmlformats.org/markup-compatibility/2006">
-        <mc:Choice xmlns:a14="http://schemas.microsoft.com/office/drawing/2010/main" Requires="a14">
+      <mc:AlternateContent xmlns:mc="http://schemas.openxmlformats.org/markup-compatibility/2006" xmlns:a14="http://schemas.microsoft.com/office/drawing/2010/main">
+        <mc:Choice Requires="a14">
           <p:sp>
             <p:nvSpPr>
               <p:cNvPr id="5" name="TextBox 4">
@@ -32743,7 +32747,7 @@
             </p:txBody>
           </p:sp>
         </mc:Choice>
-        <mc:Fallback>
+        <mc:Fallback xmlns="">
           <p:sp>
             <p:nvSpPr>
               <p:cNvPr id="5" name="TextBox 4">
@@ -32788,8 +32792,8 @@
           </p:sp>
         </mc:Fallback>
       </mc:AlternateContent>
-      <mc:AlternateContent xmlns:mc="http://schemas.openxmlformats.org/markup-compatibility/2006">
-        <mc:Choice xmlns:a14="http://schemas.microsoft.com/office/drawing/2010/main" Requires="a14">
+      <mc:AlternateContent xmlns:mc="http://schemas.openxmlformats.org/markup-compatibility/2006" xmlns:a14="http://schemas.microsoft.com/office/drawing/2010/main">
+        <mc:Choice Requires="a14">
           <p:sp>
             <p:nvSpPr>
               <p:cNvPr id="12" name="TextBox 11">
@@ -32879,7 +32883,7 @@
             </p:txBody>
           </p:sp>
         </mc:Choice>
-        <mc:Fallback>
+        <mc:Fallback xmlns="">
           <p:sp>
             <p:nvSpPr>
               <p:cNvPr id="12" name="TextBox 11">
@@ -33357,8 +33361,8 @@
           </a:prstGeom>
         </p:spPr>
       </p:pic>
-      <mc:AlternateContent xmlns:mc="http://schemas.openxmlformats.org/markup-compatibility/2006">
-        <mc:Choice xmlns:a14="http://schemas.microsoft.com/office/drawing/2010/main" Requires="a14">
+      <mc:AlternateContent xmlns:mc="http://schemas.openxmlformats.org/markup-compatibility/2006" xmlns:a14="http://schemas.microsoft.com/office/drawing/2010/main">
+        <mc:Choice Requires="a14">
           <p:sp>
             <p:nvSpPr>
               <p:cNvPr id="29" name="TextBox 28">
@@ -33435,7 +33439,7 @@
             </p:txBody>
           </p:sp>
         </mc:Choice>
-        <mc:Fallback>
+        <mc:Fallback xmlns="">
           <p:sp>
             <p:nvSpPr>
               <p:cNvPr id="29" name="TextBox 28">
@@ -38147,8 +38151,8 @@
           </a:p>
         </p:txBody>
       </p:sp>
-      <mc:AlternateContent xmlns:mc="http://schemas.openxmlformats.org/markup-compatibility/2006">
-        <mc:Choice xmlns:a14="http://schemas.microsoft.com/office/drawing/2010/main" Requires="a14">
+      <mc:AlternateContent xmlns:mc="http://schemas.openxmlformats.org/markup-compatibility/2006" xmlns:a14="http://schemas.microsoft.com/office/drawing/2010/main">
+        <mc:Choice Requires="a14">
           <p:sp>
             <p:nvSpPr>
               <p:cNvPr id="5" name="TextBox 4">
@@ -38238,7 +38242,7 @@
             </p:txBody>
           </p:sp>
         </mc:Choice>
-        <mc:Fallback>
+        <mc:Fallback xmlns="">
           <p:sp>
             <p:nvSpPr>
               <p:cNvPr id="5" name="TextBox 4">
@@ -38283,8 +38287,8 @@
           </p:sp>
         </mc:Fallback>
       </mc:AlternateContent>
-      <mc:AlternateContent xmlns:mc="http://schemas.openxmlformats.org/markup-compatibility/2006">
-        <mc:Choice xmlns:a14="http://schemas.microsoft.com/office/drawing/2010/main" Requires="a14">
+      <mc:AlternateContent xmlns:mc="http://schemas.openxmlformats.org/markup-compatibility/2006" xmlns:a14="http://schemas.microsoft.com/office/drawing/2010/main">
+        <mc:Choice Requires="a14">
           <p:sp>
             <p:nvSpPr>
               <p:cNvPr id="12" name="TextBox 11">
@@ -38374,7 +38378,7 @@
             </p:txBody>
           </p:sp>
         </mc:Choice>
-        <mc:Fallback>
+        <mc:Fallback xmlns="">
           <p:sp>
             <p:nvSpPr>
               <p:cNvPr id="12" name="TextBox 11">
@@ -38852,8 +38856,8 @@
           </a:prstGeom>
         </p:spPr>
       </p:pic>
-      <mc:AlternateContent xmlns:mc="http://schemas.openxmlformats.org/markup-compatibility/2006">
-        <mc:Choice xmlns:a14="http://schemas.microsoft.com/office/drawing/2010/main" Requires="a14">
+      <mc:AlternateContent xmlns:mc="http://schemas.openxmlformats.org/markup-compatibility/2006" xmlns:a14="http://schemas.microsoft.com/office/drawing/2010/main">
+        <mc:Choice Requires="a14">
           <p:sp>
             <p:nvSpPr>
               <p:cNvPr id="29" name="TextBox 28">
@@ -38930,7 +38934,7 @@
             </p:txBody>
           </p:sp>
         </mc:Choice>
-        <mc:Fallback>
+        <mc:Fallback xmlns="">
           <p:sp>
             <p:nvSpPr>
               <p:cNvPr id="29" name="TextBox 28">
@@ -39385,123 +39389,26 @@
         </p:nvSpPr>
         <p:spPr/>
         <p:txBody>
-          <a:bodyPr>
-            <a:normAutofit fontScale="90000"/>
-          </a:bodyPr>
+          <a:bodyPr/>
           <a:lstStyle/>
           <a:p>
             <a:pPr marL="0" lvl="0" indent="0">
               <a:buNone/>
             </a:pPr>
             <a:r>
-              <a:t>Inferring the parameters of UNTB from outcomes</a:t>
-            </a:r>
-          </a:p>
-        </p:txBody>
-      </p:sp>
-      <p:sp>
-        <p:nvSpPr>
-          <p:cNvPr id="3" name="Content Placeholder 2"/>
-          <p:cNvSpPr>
-            <a:spLocks noGrp="1"/>
-          </p:cNvSpPr>
-          <p:nvPr>
-            <p:ph idx="1"/>
-          </p:nvPr>
-        </p:nvSpPr>
-        <p:spPr/>
-        <p:txBody>
-          <a:bodyPr>
-            <a:normAutofit fontScale="62500" lnSpcReduction="20000"/>
-          </a:bodyPr>
-          <a:lstStyle/>
-          <a:p>
-            <a:pPr marL="0" lvl="0" indent="0">
-              <a:spcBef>
-                <a:spcPts val="3000"/>
-              </a:spcBef>
-              <a:buNone/>
-            </a:pPr>
-            <a:r>
-              <a:rPr b="1"/>
-              <a:t>Key questions</a:t>
-            </a:r>
-          </a:p>
-          <a:p>
-            <a:pPr marL="342900" lvl="0" indent="-342900">
-              <a:buAutoNum type="arabicPeriod"/>
-            </a:pPr>
-            <a:r>
-              <a:t>How do we use the outcomes of a process model to guess at underlying processes?</a:t>
-            </a:r>
-          </a:p>
-          <a:p>
-            <a:pPr marL="342900" lvl="0" indent="-342900">
-              <a:buAutoNum type="arabicPeriod"/>
-            </a:pPr>
-            <a:r>
-              <a:t>How can we leverage machine learning (random forest) to infer parameter values from the outcomes of a neutral model?</a:t>
-            </a:r>
-          </a:p>
-          <a:p>
-            <a:pPr marL="342900" lvl="0" indent="-342900">
-              <a:buAutoNum type="arabicPeriod"/>
-            </a:pPr>
-            <a:r>
-              <a:t>What are the limiting factors in inferring process from outcome in a process model?</a:t>
-            </a:r>
-          </a:p>
-          <a:p>
-            <a:pPr marL="0" lvl="0" indent="0">
-              <a:spcBef>
-                <a:spcPts val="3000"/>
-              </a:spcBef>
-              <a:buNone/>
-            </a:pPr>
-            <a:r>
-              <a:rPr b="1"/>
-              <a:t>Learning objectives</a:t>
-            </a:r>
-          </a:p>
-          <a:p>
-            <a:pPr marL="342900" lvl="0" indent="-342900">
-              <a:buAutoNum type="arabicPeriod"/>
-            </a:pPr>
-            <a:r>
-              <a:t>Understand the outcome-to-parameter inference model.</a:t>
-            </a:r>
-          </a:p>
-          <a:p>
-            <a:pPr marL="342900" lvl="0" indent="-342900">
-              <a:buAutoNum type="arabicPeriod"/>
-            </a:pPr>
-            <a:r>
-              <a:t>Fit and evaluate a random forest model to our UNTB data.</a:t>
-            </a:r>
-          </a:p>
-          <a:p>
-            <a:pPr marL="342900" lvl="0" indent="-342900">
-              <a:buAutoNum type="arabicPeriod"/>
-            </a:pPr>
-            <a:r>
-              <a:t>Identify the limiting features of this approach (particularly model identifiability) and brainstorm possible solutions.</a:t>
-            </a:r>
-          </a:p>
-          <a:p>
-            <a:pPr marL="0" lvl="0" indent="0">
-              <a:spcBef>
-                <a:spcPts val="3000"/>
-              </a:spcBef>
-              <a:buNone/>
-            </a:pPr>
-            <a:r>
-              <a:rPr b="1"/>
-              <a:t>Lesson outline</a:t>
-            </a:r>
+              <a:rPr lang="en-US" dirty="0"/>
+              <a:t>Inferring parameters from results in UNTB</a:t>
+            </a:r>
+            <a:endParaRPr dirty="0"/>
           </a:p>
         </p:txBody>
       </p:sp>
     </p:spTree>
+    <p:extLst>
+      <p:ext uri="{BB962C8B-B14F-4D97-AF65-F5344CB8AC3E}">
+        <p14:creationId xmlns:p14="http://schemas.microsoft.com/office/powerpoint/2010/main" val="1339736014"/>
+      </p:ext>
+    </p:extLst>
   </p:cSld>
   <p:clrMapOvr>
     <a:masterClrMapping/>
@@ -39743,23 +39650,29 @@
         </p:nvSpPr>
         <p:spPr/>
         <p:txBody>
-          <a:bodyPr>
-            <a:normAutofit fontScale="90000"/>
-          </a:bodyPr>
+          <a:bodyPr/>
           <a:lstStyle/>
           <a:p>
             <a:pPr marL="0" lvl="0" indent="0">
               <a:buNone/>
             </a:pPr>
             <a:r>
-              <a:t>(Lecture/discussion) Going from outcome to process</a:t>
-            </a:r>
+              <a:rPr lang="en-US" dirty="0"/>
+              <a:t>Inferring parameters from results in UNTB</a:t>
+            </a:r>
+            <a:endParaRPr dirty="0"/>
           </a:p>
         </p:txBody>
       </p:sp>
       <p:sp>
         <p:nvSpPr>
-          <p:cNvPr id="3" name="Content Placeholder 2"/>
+          <p:cNvPr id="3" name="Content Placeholder 2">
+            <a:extLst>
+              <a:ext uri="{FF2B5EF4-FFF2-40B4-BE49-F238E27FC236}">
+                <a16:creationId xmlns:a16="http://schemas.microsoft.com/office/drawing/2014/main" id="{AD10E003-ED85-A5E5-3D40-00514C43DA40}"/>
+              </a:ext>
+            </a:extLst>
+          </p:cNvPr>
           <p:cNvSpPr>
             <a:spLocks noGrp="1"/>
           </p:cNvSpPr>
@@ -39767,81 +39680,53 @@
             <p:ph idx="1"/>
           </p:nvPr>
         </p:nvSpPr>
-        <p:spPr/>
+        <p:spPr>
+          <a:xfrm>
+            <a:off x="457200" y="1200151"/>
+            <a:ext cx="8229600" cy="3394472"/>
+          </a:xfrm>
+        </p:spPr>
         <p:txBody>
-          <a:bodyPr>
-            <a:normAutofit fontScale="92500" lnSpcReduction="20000"/>
-          </a:bodyPr>
+          <a:bodyPr/>
           <a:lstStyle/>
           <a:p>
-            <a:pPr marL="0" lvl="0" indent="0">
-              <a:buNone/>
-            </a:pPr>
-            <a:r>
-              <a:t>Key question:</a:t>
-            </a:r>
-          </a:p>
-          <a:p>
-            <a:pPr marL="342900" lvl="0" indent="-342900">
+            <a:pPr marL="457200" indent="-457200">
+              <a:buFont typeface="+mj-lt"/>
               <a:buAutoNum type="arabicPeriod"/>
             </a:pPr>
             <a:r>
-              <a:t>How could we </a:t>
-            </a:r>
-            <a:r>
-              <a:rPr i="1"/>
-              <a:t>use</a:t>
-            </a:r>
-            <a:r>
-              <a:t> a process model to better understand actual data?</a:t>
-            </a:r>
-          </a:p>
-          <a:p>
-            <a:pPr marL="0" lvl="0" indent="0">
-              <a:buNone/>
-            </a:pPr>
-            <a:r>
-              <a:t>Key points:</a:t>
-            </a:r>
-          </a:p>
-          <a:p>
-            <a:pPr marL="342900" lvl="0" indent="-342900">
+              <a:rPr lang="en-US" dirty="0"/>
+              <a:t>What do we mean by inferring parameters from outcomes?</a:t>
+            </a:r>
+          </a:p>
+          <a:p>
+            <a:pPr marL="457200" indent="-457200">
+              <a:buFont typeface="+mj-lt"/>
               <a:buAutoNum type="arabicPeriod"/>
             </a:pPr>
             <a:r>
-              <a:t>We might have empirical data and we want to know how it was generated. We could compare the observed data (e.g. Hill numbers) to a process model to see which outcomes are (in)consistent.</a:t>
-            </a:r>
-          </a:p>
-          <a:p>
-            <a:pPr marL="342900" lvl="0" indent="-342900">
+              <a:rPr lang="en-US" dirty="0"/>
+              <a:t>How do we approach this for UNTB?</a:t>
+            </a:r>
+          </a:p>
+          <a:p>
+            <a:pPr marL="457200" indent="-457200">
+              <a:buFont typeface="+mj-lt"/>
               <a:buAutoNum type="arabicPeriod"/>
             </a:pPr>
             <a:r>
-              <a:rPr i="1"/>
-              <a:t>Consistent</a:t>
-            </a:r>
-            <a:r>
-              <a:t> is not the same as </a:t>
-            </a:r>
-            <a:r>
-              <a:rPr i="1"/>
-              <a:t>confirming</a:t>
-            </a:r>
-            <a:r>
-              <a:t>!</a:t>
-            </a:r>
-          </a:p>
-          <a:p>
-            <a:pPr marL="342900" lvl="0" indent="-342900">
-              <a:buAutoNum type="arabicPeriod"/>
-            </a:pPr>
-            <a:r>
-              <a:t>As a starting point, we can see if we can recover generative parameters when we know how they were produced.</a:t>
+              <a:rPr lang="en-US" dirty="0"/>
+              <a:t>What are the challenges we run into?</a:t>
             </a:r>
           </a:p>
         </p:txBody>
       </p:sp>
     </p:spTree>
+    <p:extLst>
+      <p:ext uri="{BB962C8B-B14F-4D97-AF65-F5344CB8AC3E}">
+        <p14:creationId xmlns:p14="http://schemas.microsoft.com/office/powerpoint/2010/main" val="1030137712"/>
+      </p:ext>
+    </p:extLst>
   </p:cSld>
   <p:clrMapOvr>
     <a:masterClrMapping/>
@@ -39878,21 +39763,37 @@
         </p:nvSpPr>
         <p:spPr/>
         <p:txBody>
-          <a:bodyPr/>
+          <a:bodyPr>
+            <a:normAutofit fontScale="90000"/>
+          </a:bodyPr>
           <a:lstStyle/>
           <a:p>
             <a:pPr marL="0" lvl="0" indent="0">
               <a:buNone/>
             </a:pPr>
             <a:r>
-              <a:t>(Lecture/discussion) Random forest regression</a:t>
-            </a:r>
+              <a:rPr lang="en-US" dirty="0"/>
+              <a:t>What do we mean by inferring parameters from outcomes</a:t>
+            </a:r>
+            <a:r>
+              <a:rPr lang="en-US" dirty="0">
+                <a:sym typeface="Wingdings" pitchFamily="2" charset="2"/>
+              </a:rPr>
+              <a:t>?</a:t>
+            </a:r>
+            <a:endParaRPr dirty="0"/>
           </a:p>
         </p:txBody>
       </p:sp>
       <p:sp>
         <p:nvSpPr>
-          <p:cNvPr id="3" name="Content Placeholder 2"/>
+          <p:cNvPr id="3" name="Content Placeholder 2">
+            <a:extLst>
+              <a:ext uri="{FF2B5EF4-FFF2-40B4-BE49-F238E27FC236}">
+                <a16:creationId xmlns:a16="http://schemas.microsoft.com/office/drawing/2014/main" id="{AD10E003-ED85-A5E5-3D40-00514C43DA40}"/>
+              </a:ext>
+            </a:extLst>
+          </p:cNvPr>
           <p:cNvSpPr>
             <a:spLocks noGrp="1"/>
           </p:cNvSpPr>
@@ -39900,56 +39801,83 @@
             <p:ph idx="1"/>
           </p:nvPr>
         </p:nvSpPr>
-        <p:spPr/>
+        <p:spPr>
+          <a:xfrm>
+            <a:off x="457200" y="1200151"/>
+            <a:ext cx="8229600" cy="3394472"/>
+          </a:xfrm>
+        </p:spPr>
         <p:txBody>
-          <a:bodyPr>
-            <a:normAutofit lnSpcReduction="10000"/>
+          <a:bodyPr/>
+          <a:lstStyle/>
+          <a:p>
+            <a:pPr>
+              <a:buFont typeface="Arial" panose="020B0604020202020204" pitchFamily="34" charset="0"/>
+              <a:buChar char="•"/>
+            </a:pPr>
+            <a:r>
+              <a:rPr lang="en-US" dirty="0"/>
+              <a:t>Assuming the </a:t>
+            </a:r>
+            <a:r>
+              <a:rPr lang="en-US" i="1" dirty="0"/>
+              <a:t>processes </a:t>
+            </a:r>
+            <a:r>
+              <a:rPr lang="en-US" dirty="0"/>
+              <a:t>in a model accurately describe the processes that generated some data***… </a:t>
+            </a:r>
+            <a:br>
+              <a:rPr lang="en-US" dirty="0"/>
+            </a:br>
+            <a:endParaRPr lang="en-US" dirty="0"/>
+          </a:p>
+        </p:txBody>
+      </p:sp>
+      <p:sp>
+        <p:nvSpPr>
+          <p:cNvPr id="4" name="TextBox 3">
+            <a:extLst>
+              <a:ext uri="{FF2B5EF4-FFF2-40B4-BE49-F238E27FC236}">
+                <a16:creationId xmlns:a16="http://schemas.microsoft.com/office/drawing/2014/main" id="{1C24D77E-0D5A-4826-9A2C-9D0FCBBED64C}"/>
+              </a:ext>
+            </a:extLst>
+          </p:cNvPr>
+          <p:cNvSpPr txBox="1"/>
+          <p:nvPr/>
+        </p:nvSpPr>
+        <p:spPr>
+          <a:xfrm>
+            <a:off x="457200" y="4705111"/>
+            <a:ext cx="4572000" cy="369332"/>
+          </a:xfrm>
+          <a:prstGeom prst="rect">
+            <a:avLst/>
+          </a:prstGeom>
+          <a:noFill/>
+        </p:spPr>
+        <p:txBody>
+          <a:bodyPr wrap="square">
+            <a:spAutoFit/>
           </a:bodyPr>
           <a:lstStyle/>
           <a:p>
-            <a:pPr marL="0" lvl="0" indent="0">
+            <a:pPr marL="342900" lvl="1" indent="0">
               <a:buNone/>
             </a:pPr>
             <a:r>
-              <a:t>Key points:</a:t>
-            </a:r>
-          </a:p>
-          <a:p>
-            <a:pPr marL="342900" lvl="0" indent="-342900">
-              <a:buAutoNum type="arabicPeriod"/>
-            </a:pPr>
-            <a:r>
-              <a:t>To guess at the parameters that generated some outcome data, we’re writing a model of the general form </a:t>
-            </a:r>
-            <a:r>
-              <a:rPr>
-                <a:latin typeface="Courier"/>
-              </a:rPr>
-              <a:t>parameter ~ results</a:t>
-            </a:r>
-            <a:r>
-              <a:t>. This isn’t necessarily a linear or otherwise tidy relationship, so we’ll use machine learning.</a:t>
-            </a:r>
-          </a:p>
-          <a:p>
-            <a:pPr marL="342900" lvl="0" indent="-342900">
-              <a:buAutoNum type="arabicPeriod"/>
-            </a:pPr>
-            <a:r>
-              <a:t>Random forest can do regression with many parameters predicting nonlinear relationships.</a:t>
-            </a:r>
-          </a:p>
-          <a:p>
-            <a:pPr marL="342900" lvl="0" indent="-342900">
-              <a:buAutoNum type="arabicPeriod"/>
-            </a:pPr>
-            <a:r>
-              <a:t>We will begin by using a random forest to try to recover parameter values for known sims.</a:t>
+              <a:rPr lang="en-US" dirty="0"/>
+              <a:t>*** This is a big assumption!</a:t>
             </a:r>
           </a:p>
         </p:txBody>
       </p:sp>
     </p:spTree>
+    <p:extLst>
+      <p:ext uri="{BB962C8B-B14F-4D97-AF65-F5344CB8AC3E}">
+        <p14:creationId xmlns:p14="http://schemas.microsoft.com/office/powerpoint/2010/main" val="1327927075"/>
+      </p:ext>
+    </p:extLst>
   </p:cSld>
   <p:clrMapOvr>
     <a:masterClrMapping/>
@@ -39995,12 +39923,126 @@
               <a:buNone/>
             </a:pPr>
             <a:r>
-              <a:t>(Coding exercise) Fitting a random forest to our neutral data</a:t>
+              <a:rPr lang="en-US" dirty="0"/>
+              <a:t>What do we mean by inferring parameters from outcomes</a:t>
+            </a:r>
+            <a:r>
+              <a:rPr lang="en-US" dirty="0">
+                <a:sym typeface="Wingdings" pitchFamily="2" charset="2"/>
+              </a:rPr>
+              <a:t>?</a:t>
+            </a:r>
+            <a:endParaRPr dirty="0"/>
+          </a:p>
+        </p:txBody>
+      </p:sp>
+      <p:sp>
+        <p:nvSpPr>
+          <p:cNvPr id="3" name="Content Placeholder 2">
+            <a:extLst>
+              <a:ext uri="{FF2B5EF4-FFF2-40B4-BE49-F238E27FC236}">
+                <a16:creationId xmlns:a16="http://schemas.microsoft.com/office/drawing/2014/main" id="{AD10E003-ED85-A5E5-3D40-00514C43DA40}"/>
+              </a:ext>
+            </a:extLst>
+          </p:cNvPr>
+          <p:cNvSpPr>
+            <a:spLocks noGrp="1"/>
+          </p:cNvSpPr>
+          <p:nvPr>
+            <p:ph idx="1"/>
+          </p:nvPr>
+        </p:nvSpPr>
+        <p:spPr>
+          <a:xfrm>
+            <a:off x="457200" y="1200151"/>
+            <a:ext cx="8229600" cy="3394472"/>
+          </a:xfrm>
+        </p:spPr>
+        <p:txBody>
+          <a:bodyPr/>
+          <a:lstStyle/>
+          <a:p>
+            <a:pPr>
+              <a:buFont typeface="Arial" panose="020B0604020202020204" pitchFamily="34" charset="0"/>
+              <a:buChar char="•"/>
+            </a:pPr>
+            <a:r>
+              <a:rPr lang="en-US" dirty="0"/>
+              <a:t>Assuming the </a:t>
+            </a:r>
+            <a:r>
+              <a:rPr lang="en-US" i="1" dirty="0"/>
+              <a:t>processes </a:t>
+            </a:r>
+            <a:r>
+              <a:rPr lang="en-US" dirty="0"/>
+              <a:t>in a model accurately describe the processes that generated some data***… </a:t>
+            </a:r>
+            <a:br>
+              <a:rPr lang="en-US" dirty="0"/>
+            </a:br>
+            <a:br>
+              <a:rPr lang="en-US" dirty="0"/>
+            </a:br>
+            <a:r>
+              <a:rPr lang="en-US" i="1" dirty="0"/>
+              <a:t>…we can use our knowledge of the model to guess the parameter settings that generated a specific outcome</a:t>
+            </a:r>
+            <a:r>
+              <a:rPr lang="en-US" dirty="0"/>
+              <a:t>.</a:t>
+            </a:r>
+            <a:br>
+              <a:rPr lang="en-US" dirty="0"/>
+            </a:br>
+            <a:endParaRPr lang="en-US" i="1" dirty="0"/>
+          </a:p>
+        </p:txBody>
+      </p:sp>
+      <p:sp>
+        <p:nvSpPr>
+          <p:cNvPr id="4" name="TextBox 3">
+            <a:extLst>
+              <a:ext uri="{FF2B5EF4-FFF2-40B4-BE49-F238E27FC236}">
+                <a16:creationId xmlns:a16="http://schemas.microsoft.com/office/drawing/2014/main" id="{E9002705-0E39-9E82-37B0-BB1446569E57}"/>
+              </a:ext>
+            </a:extLst>
+          </p:cNvPr>
+          <p:cNvSpPr txBox="1"/>
+          <p:nvPr/>
+        </p:nvSpPr>
+        <p:spPr>
+          <a:xfrm>
+            <a:off x="457200" y="4705111"/>
+            <a:ext cx="4572000" cy="369332"/>
+          </a:xfrm>
+          <a:prstGeom prst="rect">
+            <a:avLst/>
+          </a:prstGeom>
+          <a:noFill/>
+        </p:spPr>
+        <p:txBody>
+          <a:bodyPr wrap="square">
+            <a:spAutoFit/>
+          </a:bodyPr>
+          <a:lstStyle/>
+          <a:p>
+            <a:pPr marL="342900" lvl="1" indent="0">
+              <a:buNone/>
+            </a:pPr>
+            <a:r>
+              <a:rPr lang="en-US" dirty="0"/>
+              <a:t>*** This is a big assumption!</a:t>
             </a:r>
           </a:p>
         </p:txBody>
       </p:sp>
     </p:spTree>
+    <p:extLst>
+      <p:ext uri="{BB962C8B-B14F-4D97-AF65-F5344CB8AC3E}">
+        <p14:creationId xmlns:p14="http://schemas.microsoft.com/office/powerpoint/2010/main" val="3972428934"/>
+      </p:ext>
+    </p:extLst>
   </p:cSld>
   <p:clrMapOvr>
     <a:masterClrMapping/>
@@ -40046,14 +40088,28 @@
               <a:buNone/>
             </a:pPr>
             <a:r>
-              <a:t>(Discussion) What problems arise in the random forest?</a:t>
-            </a:r>
+              <a:rPr lang="en-US" dirty="0"/>
+              <a:t>What do we mean by inferring parameters from outcomes</a:t>
+            </a:r>
+            <a:r>
+              <a:rPr lang="en-US" dirty="0">
+                <a:sym typeface="Wingdings" pitchFamily="2" charset="2"/>
+              </a:rPr>
+              <a:t>?</a:t>
+            </a:r>
+            <a:endParaRPr dirty="0"/>
           </a:p>
         </p:txBody>
       </p:sp>
       <p:sp>
         <p:nvSpPr>
-          <p:cNvPr id="3" name="Content Placeholder 2"/>
+          <p:cNvPr id="3" name="Content Placeholder 2">
+            <a:extLst>
+              <a:ext uri="{FF2B5EF4-FFF2-40B4-BE49-F238E27FC236}">
+                <a16:creationId xmlns:a16="http://schemas.microsoft.com/office/drawing/2014/main" id="{AD10E003-ED85-A5E5-3D40-00514C43DA40}"/>
+              </a:ext>
+            </a:extLst>
+          </p:cNvPr>
           <p:cNvSpPr>
             <a:spLocks noGrp="1"/>
           </p:cNvSpPr>
@@ -40061,29 +40117,116 @@
             <p:ph idx="1"/>
           </p:nvPr>
         </p:nvSpPr>
-        <p:spPr/>
+        <p:spPr>
+          <a:xfrm>
+            <a:off x="457200" y="1200151"/>
+            <a:ext cx="8229600" cy="3737370"/>
+          </a:xfrm>
+        </p:spPr>
         <p:txBody>
-          <a:bodyPr/>
+          <a:bodyPr>
+            <a:normAutofit/>
+          </a:bodyPr>
           <a:lstStyle/>
           <a:p>
-            <a:pPr marL="0" lvl="0" indent="0">
+            <a:pPr>
+              <a:buFont typeface="Arial" panose="020B0604020202020204" pitchFamily="34" charset="0"/>
+              <a:buChar char="•"/>
+            </a:pPr>
+            <a:r>
+              <a:rPr lang="en-US" dirty="0"/>
+              <a:t>Assuming the </a:t>
+            </a:r>
+            <a:r>
+              <a:rPr lang="en-US" i="1" dirty="0"/>
+              <a:t>processes </a:t>
+            </a:r>
+            <a:r>
+              <a:rPr lang="en-US" dirty="0"/>
+              <a:t>in a model accurately describe the processes that generated some data***… </a:t>
+            </a:r>
+            <a:br>
+              <a:rPr lang="en-US" dirty="0"/>
+            </a:br>
+            <a:br>
+              <a:rPr lang="en-US" dirty="0"/>
+            </a:br>
+            <a:r>
+              <a:rPr lang="en-US" i="1" dirty="0"/>
+              <a:t>…we can use our knowledge of the model to guess the parameter settings that generated a specific outcome</a:t>
+            </a:r>
+            <a:r>
+              <a:rPr lang="en-US" dirty="0"/>
+              <a:t>.</a:t>
+            </a:r>
+          </a:p>
+          <a:p>
+            <a:pPr>
+              <a:buFont typeface="Arial" panose="020B0604020202020204" pitchFamily="34" charset="0"/>
+              <a:buChar char="•"/>
+            </a:pPr>
+            <a:endParaRPr lang="en-US" dirty="0"/>
+          </a:p>
+          <a:p>
+            <a:pPr>
+              <a:buFont typeface="Arial" panose="020B0604020202020204" pitchFamily="34" charset="0"/>
+              <a:buChar char="•"/>
+            </a:pPr>
+            <a:r>
+              <a:rPr lang="en-US" dirty="0"/>
+              <a:t>This is the backbone of likelihood-free inference (coming up soon!)</a:t>
+            </a:r>
+            <a:br>
+              <a:rPr lang="en-US" dirty="0"/>
+            </a:br>
+            <a:endParaRPr lang="en-US" i="1" dirty="0"/>
+          </a:p>
+        </p:txBody>
+      </p:sp>
+      <p:sp>
+        <p:nvSpPr>
+          <p:cNvPr id="5" name="TextBox 4">
+            <a:extLst>
+              <a:ext uri="{FF2B5EF4-FFF2-40B4-BE49-F238E27FC236}">
+                <a16:creationId xmlns:a16="http://schemas.microsoft.com/office/drawing/2014/main" id="{82718516-C273-3468-8B51-E13DD63E0941}"/>
+              </a:ext>
+            </a:extLst>
+          </p:cNvPr>
+          <p:cNvSpPr txBox="1"/>
+          <p:nvPr/>
+        </p:nvSpPr>
+        <p:spPr>
+          <a:xfrm>
+            <a:off x="457200" y="4705111"/>
+            <a:ext cx="4572000" cy="369332"/>
+          </a:xfrm>
+          <a:prstGeom prst="rect">
+            <a:avLst/>
+          </a:prstGeom>
+          <a:noFill/>
+        </p:spPr>
+        <p:txBody>
+          <a:bodyPr wrap="square">
+            <a:spAutoFit/>
+          </a:bodyPr>
+          <a:lstStyle/>
+          <a:p>
+            <a:pPr marL="342900" lvl="1" indent="0">
               <a:buNone/>
             </a:pPr>
             <a:r>
-              <a:t>Key points:</a:t>
-            </a:r>
-          </a:p>
-          <a:p>
-            <a:pPr marL="342900" lvl="0" indent="-342900">
-              <a:buAutoNum type="arabicPeriod"/>
-            </a:pPr>
-            <a:r>
-              <a:t>Multiple sets of parameters can lead to the same outcomes, making it difficult to infer backwards.</a:t>
+              <a:rPr lang="en-US" dirty="0"/>
+              <a:t>*** This is a big assumption!</a:t>
             </a:r>
           </a:p>
         </p:txBody>
       </p:sp>
     </p:spTree>
+    <p:extLst>
+      <p:ext uri="{BB962C8B-B14F-4D97-AF65-F5344CB8AC3E}">
+        <p14:creationId xmlns:p14="http://schemas.microsoft.com/office/powerpoint/2010/main" val="883533137"/>
+      </p:ext>
+    </p:extLst>
   </p:cSld>
   <p:clrMapOvr>
     <a:masterClrMapping/>
@@ -40108,9 +40251,51 @@
           <a:chExt cx="0" cy="0"/>
         </a:xfrm>
       </p:grpSpPr>
+      <p:pic>
+        <p:nvPicPr>
+          <p:cNvPr id="18" name="Graphic 17" descr="Arrow Right with solid fill">
+            <a:extLst>
+              <a:ext uri="{FF2B5EF4-FFF2-40B4-BE49-F238E27FC236}">
+                <a16:creationId xmlns:a16="http://schemas.microsoft.com/office/drawing/2014/main" id="{78246A6F-83C5-D181-47AF-3D2C3BDA7214}"/>
+              </a:ext>
+            </a:extLst>
+          </p:cNvPr>
+          <p:cNvPicPr>
+            <a:picLocks noChangeAspect="1"/>
+          </p:cNvPicPr>
+          <p:nvPr/>
+        </p:nvPicPr>
+        <p:blipFill>
+          <a:blip r:embed="rId2">
+            <a:extLst>
+              <a:ext uri="{96DAC541-7B7A-43D3-8B79-37D633B846F1}">
+                <asvg:svgBlip xmlns:asvg="http://schemas.microsoft.com/office/drawing/2016/SVG/main" r:embed="rId3"/>
+              </a:ext>
+            </a:extLst>
+          </a:blip>
+          <a:stretch>
+            <a:fillRect/>
+          </a:stretch>
+        </p:blipFill>
+        <p:spPr>
+          <a:xfrm>
+            <a:off x="5592336" y="1760185"/>
+            <a:ext cx="731433" cy="731433"/>
+          </a:xfrm>
+          <a:prstGeom prst="rect">
+            <a:avLst/>
+          </a:prstGeom>
+        </p:spPr>
+      </p:pic>
       <p:sp>
         <p:nvSpPr>
-          <p:cNvPr id="2" name="Title 1"/>
+          <p:cNvPr id="2" name="Title 1">
+            <a:extLst>
+              <a:ext uri="{FF2B5EF4-FFF2-40B4-BE49-F238E27FC236}">
+                <a16:creationId xmlns:a16="http://schemas.microsoft.com/office/drawing/2014/main" id="{CCA19E68-E74E-29A0-3D88-7D4756F3637F}"/>
+              </a:ext>
+            </a:extLst>
+          </p:cNvPr>
           <p:cNvSpPr>
             <a:spLocks noGrp="1"/>
           </p:cNvSpPr>
@@ -40120,28 +40305,354 @@
         </p:nvSpPr>
         <p:spPr/>
         <p:txBody>
-          <a:bodyPr>
-            <a:normAutofit fontScale="90000"/>
-          </a:bodyPr>
+          <a:bodyPr/>
           <a:lstStyle/>
           <a:p>
-            <a:pPr marL="0" lvl="0" indent="0">
-              <a:buNone/>
-            </a:pPr>
-            <a:r>
-              <a:t>(Discussion) How might we address these challenges?</a:t>
+            <a:r>
+              <a:rPr lang="en-US" dirty="0"/>
+              <a:t>The (general) model structure</a:t>
             </a:r>
           </a:p>
         </p:txBody>
       </p:sp>
       <p:sp>
         <p:nvSpPr>
-          <p:cNvPr id="3" name="Content Placeholder 2"/>
+          <p:cNvPr id="5" name="TextBox 4">
+            <a:extLst>
+              <a:ext uri="{FF2B5EF4-FFF2-40B4-BE49-F238E27FC236}">
+                <a16:creationId xmlns:a16="http://schemas.microsoft.com/office/drawing/2014/main" id="{B90473A7-02C2-495E-732E-ED806708C1A3}"/>
+              </a:ext>
+            </a:extLst>
+          </p:cNvPr>
+          <p:cNvSpPr txBox="1"/>
+          <p:nvPr/>
+        </p:nvSpPr>
+        <p:spPr>
+          <a:xfrm>
+            <a:off x="651230" y="1205441"/>
+            <a:ext cx="2330095" cy="923330"/>
+          </a:xfrm>
+          <a:prstGeom prst="rect">
+            <a:avLst/>
+          </a:prstGeom>
+          <a:noFill/>
+        </p:spPr>
+        <p:txBody>
+          <a:bodyPr wrap="square" rtlCol="0">
+            <a:spAutoFit/>
+          </a:bodyPr>
+          <a:lstStyle/>
+          <a:p>
+            <a:pPr algn="ctr"/>
+            <a:r>
+              <a:rPr lang="en-US" dirty="0"/>
+              <a:t>Run simulations over a wide range of parameter settings.</a:t>
+            </a:r>
+          </a:p>
+        </p:txBody>
+      </p:sp>
+      <p:pic>
+        <p:nvPicPr>
+          <p:cNvPr id="8" name="Graphic 7" descr="Table with solid fill">
+            <a:extLst>
+              <a:ext uri="{FF2B5EF4-FFF2-40B4-BE49-F238E27FC236}">
+                <a16:creationId xmlns:a16="http://schemas.microsoft.com/office/drawing/2014/main" id="{3F869F2C-3224-BA04-EEE9-892897AECC7B}"/>
+              </a:ext>
+            </a:extLst>
+          </p:cNvPr>
+          <p:cNvPicPr>
+            <a:picLocks noChangeAspect="1"/>
+          </p:cNvPicPr>
+          <p:nvPr/>
+        </p:nvPicPr>
+        <p:blipFill>
+          <a:blip r:embed="rId4">
+            <a:extLst>
+              <a:ext uri="{96DAC541-7B7A-43D3-8B79-37D633B846F1}">
+                <asvg:svgBlip xmlns:asvg="http://schemas.microsoft.com/office/drawing/2016/SVG/main" r:embed="rId5"/>
+              </a:ext>
+            </a:extLst>
+          </a:blip>
+          <a:stretch>
+            <a:fillRect/>
+          </a:stretch>
+        </p:blipFill>
+        <p:spPr>
+          <a:xfrm>
+            <a:off x="4114800" y="1587781"/>
+            <a:ext cx="914400" cy="914400"/>
+          </a:xfrm>
+          <a:prstGeom prst="rect">
+            <a:avLst/>
+          </a:prstGeom>
+        </p:spPr>
+      </p:pic>
+      <p:sp>
+        <p:nvSpPr>
+          <p:cNvPr id="11" name="TextBox 10">
+            <a:extLst>
+              <a:ext uri="{FF2B5EF4-FFF2-40B4-BE49-F238E27FC236}">
+                <a16:creationId xmlns:a16="http://schemas.microsoft.com/office/drawing/2014/main" id="{D260909A-FAE1-3164-F402-B901883F17BD}"/>
+              </a:ext>
+            </a:extLst>
+          </p:cNvPr>
+          <p:cNvSpPr txBox="1"/>
+          <p:nvPr/>
+        </p:nvSpPr>
+        <p:spPr>
+          <a:xfrm>
+            <a:off x="3666752" y="1026143"/>
+            <a:ext cx="1810496" cy="615553"/>
+          </a:xfrm>
+          <a:prstGeom prst="rect">
+            <a:avLst/>
+          </a:prstGeom>
+          <a:noFill/>
+        </p:spPr>
+        <p:txBody>
+          <a:bodyPr wrap="none" rtlCol="0">
+            <a:spAutoFit/>
+          </a:bodyPr>
+          <a:lstStyle/>
+          <a:p>
+            <a:pPr algn="ctr"/>
+            <a:r>
+              <a:rPr lang="en-US" dirty="0"/>
+              <a:t>Input parameters</a:t>
+            </a:r>
+            <a:br>
+              <a:rPr lang="en-US" dirty="0"/>
+            </a:br>
+            <a:r>
+              <a:rPr lang="en-US" sz="1600" dirty="0"/>
+              <a:t>(</a:t>
+            </a:r>
+            <a:r>
+              <a:rPr lang="en-US" sz="1600" i="1" dirty="0"/>
+              <a:t>m, v, J, </a:t>
+            </a:r>
+            <a:r>
+              <a:rPr lang="en-US" sz="1600" i="1" dirty="0" err="1"/>
+              <a:t>Jm</a:t>
+            </a:r>
+            <a:r>
+              <a:rPr lang="en-US" sz="1600" i="1" dirty="0"/>
+              <a:t>, </a:t>
+            </a:r>
+            <a:r>
+              <a:rPr lang="en-US" sz="1600" i="1" dirty="0" err="1"/>
+              <a:t>Sm</a:t>
+            </a:r>
+            <a:r>
+              <a:rPr lang="en-US" sz="1600" i="1" dirty="0"/>
+              <a:t>)</a:t>
+            </a:r>
+            <a:endParaRPr lang="en-US" dirty="0"/>
+          </a:p>
+        </p:txBody>
+      </p:sp>
+      <p:pic>
+        <p:nvPicPr>
+          <p:cNvPr id="12" name="Graphic 11" descr="Table with solid fill">
+            <a:extLst>
+              <a:ext uri="{FF2B5EF4-FFF2-40B4-BE49-F238E27FC236}">
+                <a16:creationId xmlns:a16="http://schemas.microsoft.com/office/drawing/2014/main" id="{734934BB-B229-8F2E-A468-0D0003AEED68}"/>
+              </a:ext>
+            </a:extLst>
+          </p:cNvPr>
+          <p:cNvPicPr>
+            <a:picLocks noChangeAspect="1"/>
+          </p:cNvPicPr>
+          <p:nvPr/>
+        </p:nvPicPr>
+        <p:blipFill>
+          <a:blip r:embed="rId6">
+            <a:extLst>
+              <a:ext uri="{96DAC541-7B7A-43D3-8B79-37D633B846F1}">
+                <asvg:svgBlip xmlns:asvg="http://schemas.microsoft.com/office/drawing/2016/SVG/main" r:embed="rId7"/>
+              </a:ext>
+            </a:extLst>
+          </a:blip>
+          <a:stretch>
+            <a:fillRect/>
+          </a:stretch>
+        </p:blipFill>
+        <p:spPr>
+          <a:xfrm>
+            <a:off x="6804687" y="1582413"/>
+            <a:ext cx="914400" cy="914400"/>
+          </a:xfrm>
+          <a:prstGeom prst="rect">
+            <a:avLst/>
+          </a:prstGeom>
+        </p:spPr>
+      </p:pic>
+      <p:sp>
+        <p:nvSpPr>
+          <p:cNvPr id="13" name="TextBox 12">
+            <a:extLst>
+              <a:ext uri="{FF2B5EF4-FFF2-40B4-BE49-F238E27FC236}">
+                <a16:creationId xmlns:a16="http://schemas.microsoft.com/office/drawing/2014/main" id="{CC0597F6-C898-5DD7-5A09-F77BEAC3F02C}"/>
+              </a:ext>
+            </a:extLst>
+          </p:cNvPr>
+          <p:cNvSpPr txBox="1"/>
+          <p:nvPr/>
+        </p:nvSpPr>
+        <p:spPr>
+          <a:xfrm>
+            <a:off x="6352899" y="1020775"/>
+            <a:ext cx="1938223" cy="615553"/>
+          </a:xfrm>
+          <a:prstGeom prst="rect">
+            <a:avLst/>
+          </a:prstGeom>
+          <a:noFill/>
+        </p:spPr>
+        <p:txBody>
+          <a:bodyPr wrap="none" rtlCol="0">
+            <a:spAutoFit/>
+          </a:bodyPr>
+          <a:lstStyle/>
+          <a:p>
+            <a:pPr algn="ctr"/>
+            <a:r>
+              <a:rPr lang="en-US" dirty="0">
+                <a:solidFill>
+                  <a:schemeClr val="accent4"/>
+                </a:solidFill>
+              </a:rPr>
+              <a:t>Outcome variables</a:t>
+            </a:r>
+          </a:p>
+          <a:p>
+            <a:pPr algn="ctr"/>
+            <a:r>
+              <a:rPr lang="en-US" sz="1600" dirty="0">
+                <a:solidFill>
+                  <a:schemeClr val="accent4"/>
+                </a:solidFill>
+              </a:rPr>
+              <a:t>(hill0, hill1, hill2)</a:t>
+            </a:r>
+          </a:p>
+        </p:txBody>
+      </p:sp>
+      <p:sp>
+        <p:nvSpPr>
+          <p:cNvPr id="16" name="TextBox 15">
+            <a:extLst>
+              <a:ext uri="{FF2B5EF4-FFF2-40B4-BE49-F238E27FC236}">
+                <a16:creationId xmlns:a16="http://schemas.microsoft.com/office/drawing/2014/main" id="{9107F7C1-AC6D-2494-6328-E9C8F93AA63C}"/>
+              </a:ext>
+            </a:extLst>
+          </p:cNvPr>
+          <p:cNvSpPr txBox="1"/>
+          <p:nvPr/>
+        </p:nvSpPr>
+        <p:spPr>
+          <a:xfrm>
+            <a:off x="5477248" y="1705523"/>
+            <a:ext cx="961610" cy="369332"/>
+          </a:xfrm>
+          <a:prstGeom prst="rect">
+            <a:avLst/>
+          </a:prstGeom>
+          <a:noFill/>
+        </p:spPr>
+        <p:txBody>
+          <a:bodyPr wrap="none" rtlCol="0">
+            <a:spAutoFit/>
+          </a:bodyPr>
+          <a:lstStyle/>
+          <a:p>
+            <a:r>
+              <a:rPr lang="en-US" dirty="0"/>
+              <a:t>produce</a:t>
+            </a:r>
+          </a:p>
+        </p:txBody>
+      </p:sp>
+    </p:spTree>
+    <p:extLst>
+      <p:ext uri="{BB962C8B-B14F-4D97-AF65-F5344CB8AC3E}">
+        <p14:creationId xmlns:p14="http://schemas.microsoft.com/office/powerpoint/2010/main" val="1819605259"/>
+      </p:ext>
+    </p:extLst>
+  </p:cSld>
+  <p:clrMapOvr>
+    <a:masterClrMapping/>
+  </p:clrMapOvr>
+</p:sld>
+</file>
+
+<file path=ppt/slides/slide55.xml><?xml version="1.0" encoding="utf-8"?>
+<p:sld xmlns:a="http://schemas.openxmlformats.org/drawingml/2006/main" xmlns:r="http://schemas.openxmlformats.org/officeDocument/2006/relationships" xmlns:p="http://schemas.openxmlformats.org/presentationml/2006/main">
+  <p:cSld>
+    <p:spTree>
+      <p:nvGrpSpPr>
+        <p:cNvPr id="1" name=""/>
+        <p:cNvGrpSpPr/>
+        <p:nvPr/>
+      </p:nvGrpSpPr>
+      <p:grpSpPr>
+        <a:xfrm>
+          <a:off x="0" y="0"/>
+          <a:ext cx="0" cy="0"/>
+          <a:chOff x="0" y="0"/>
+          <a:chExt cx="0" cy="0"/>
+        </a:xfrm>
+      </p:grpSpPr>
+      <p:pic>
+        <p:nvPicPr>
+          <p:cNvPr id="18" name="Graphic 17" descr="Arrow Right with solid fill">
+            <a:extLst>
+              <a:ext uri="{FF2B5EF4-FFF2-40B4-BE49-F238E27FC236}">
+                <a16:creationId xmlns:a16="http://schemas.microsoft.com/office/drawing/2014/main" id="{78246A6F-83C5-D181-47AF-3D2C3BDA7214}"/>
+              </a:ext>
+            </a:extLst>
+          </p:cNvPr>
+          <p:cNvPicPr>
+            <a:picLocks noChangeAspect="1"/>
+          </p:cNvPicPr>
+          <p:nvPr/>
+        </p:nvPicPr>
+        <p:blipFill>
+          <a:blip r:embed="rId2">
+            <a:extLst>
+              <a:ext uri="{96DAC541-7B7A-43D3-8B79-37D633B846F1}">
+                <asvg:svgBlip xmlns:asvg="http://schemas.microsoft.com/office/drawing/2016/SVG/main" r:embed="rId3"/>
+              </a:ext>
+            </a:extLst>
+          </a:blip>
+          <a:stretch>
+            <a:fillRect/>
+          </a:stretch>
+        </p:blipFill>
+        <p:spPr>
+          <a:xfrm>
+            <a:off x="5592336" y="1760185"/>
+            <a:ext cx="731433" cy="731433"/>
+          </a:xfrm>
+          <a:prstGeom prst="rect">
+            <a:avLst/>
+          </a:prstGeom>
+        </p:spPr>
+      </p:pic>
+      <p:sp>
+        <p:nvSpPr>
+          <p:cNvPr id="2" name="Title 1">
+            <a:extLst>
+              <a:ext uri="{FF2B5EF4-FFF2-40B4-BE49-F238E27FC236}">
+                <a16:creationId xmlns:a16="http://schemas.microsoft.com/office/drawing/2014/main" id="{CCA19E68-E74E-29A0-3D88-7D4756F3637F}"/>
+              </a:ext>
+            </a:extLst>
+          </p:cNvPr>
           <p:cNvSpPr>
             <a:spLocks noGrp="1"/>
           </p:cNvSpPr>
           <p:nvPr>
-            <p:ph idx="1"/>
+            <p:ph type="title"/>
           </p:nvPr>
         </p:nvSpPr>
         <p:spPr/>
@@ -40149,32 +40660,1963 @@
           <a:bodyPr/>
           <a:lstStyle/>
           <a:p>
-            <a:pPr marL="0" lvl="0" indent="0">
-              <a:buNone/>
-            </a:pPr>
-            <a:r>
-              <a:t>Key points:</a:t>
-            </a:r>
-          </a:p>
-          <a:p>
-            <a:pPr marL="342900" lvl="0" indent="-342900">
-              <a:buAutoNum type="arabicPeriod"/>
-            </a:pPr>
-            <a:r>
-              <a:t>More data dimensions can break a many-to-one mapping.</a:t>
-            </a:r>
-          </a:p>
-          <a:p>
-            <a:pPr marL="342900" lvl="0" indent="-342900">
-              <a:buAutoNum type="arabicPeriod"/>
-            </a:pPr>
-            <a:r>
-              <a:t>Leaves unanswered, or assumes/works conditional on UNTB being the correct underlying game</a:t>
+            <a:r>
+              <a:rPr lang="en-US" dirty="0"/>
+              <a:t>The (general) model structure</a:t>
+            </a:r>
+          </a:p>
+        </p:txBody>
+      </p:sp>
+      <p:sp>
+        <p:nvSpPr>
+          <p:cNvPr id="5" name="TextBox 4">
+            <a:extLst>
+              <a:ext uri="{FF2B5EF4-FFF2-40B4-BE49-F238E27FC236}">
+                <a16:creationId xmlns:a16="http://schemas.microsoft.com/office/drawing/2014/main" id="{B90473A7-02C2-495E-732E-ED806708C1A3}"/>
+              </a:ext>
+            </a:extLst>
+          </p:cNvPr>
+          <p:cNvSpPr txBox="1"/>
+          <p:nvPr/>
+        </p:nvSpPr>
+        <p:spPr>
+          <a:xfrm>
+            <a:off x="651230" y="1205441"/>
+            <a:ext cx="2330095" cy="923330"/>
+          </a:xfrm>
+          <a:prstGeom prst="rect">
+            <a:avLst/>
+          </a:prstGeom>
+          <a:noFill/>
+        </p:spPr>
+        <p:txBody>
+          <a:bodyPr wrap="square" rtlCol="0">
+            <a:spAutoFit/>
+          </a:bodyPr>
+          <a:lstStyle/>
+          <a:p>
+            <a:pPr algn="ctr"/>
+            <a:r>
+              <a:rPr lang="en-US" dirty="0"/>
+              <a:t>Run simulations over a wide range of parameter settings.</a:t>
+            </a:r>
+          </a:p>
+        </p:txBody>
+      </p:sp>
+      <mc:AlternateContent xmlns:mc="http://schemas.openxmlformats.org/markup-compatibility/2006">
+        <mc:Choice xmlns:a14="http://schemas.microsoft.com/office/drawing/2010/main" Requires="a14">
+          <p:sp>
+            <p:nvSpPr>
+              <p:cNvPr id="6" name="TextBox 5">
+                <a:extLst>
+                  <a:ext uri="{FF2B5EF4-FFF2-40B4-BE49-F238E27FC236}">
+                    <a16:creationId xmlns:a16="http://schemas.microsoft.com/office/drawing/2014/main" id="{FDAE5A0E-5B87-97FB-F45F-5E400B35ACA5}"/>
+                  </a:ext>
+                </a:extLst>
+              </p:cNvPr>
+              <p:cNvSpPr txBox="1"/>
+              <p:nvPr/>
+            </p:nvSpPr>
+            <p:spPr>
+              <a:xfrm>
+                <a:off x="651229" y="2704629"/>
+                <a:ext cx="2330095" cy="646331"/>
+              </a:xfrm>
+              <a:prstGeom prst="rect">
+                <a:avLst/>
+              </a:prstGeom>
+              <a:noFill/>
+            </p:spPr>
+            <p:txBody>
+              <a:bodyPr wrap="square" rtlCol="0">
+                <a:spAutoFit/>
+              </a:bodyPr>
+              <a:lstStyle/>
+              <a:p>
+                <a:pPr algn="ctr"/>
+                <a:r>
+                  <a:rPr lang="en-US" dirty="0"/>
+                  <a:t>Fit a model of the form</a:t>
+                </a:r>
+              </a:p>
+              <a:p>
+                <a:pPr algn="ctr"/>
+                <a14:m>
+                  <m:oMathPara xmlns:m="http://schemas.openxmlformats.org/officeDocument/2006/math">
+                    <m:oMathParaPr>
+                      <m:jc m:val="centerGroup"/>
+                    </m:oMathParaPr>
+                    <m:oMath xmlns:m="http://schemas.openxmlformats.org/officeDocument/2006/math">
+                      <m:r>
+                        <a:rPr lang="en-US" b="0" i="1" smtClean="0">
+                          <a:latin typeface="Cambria Math" panose="02040503050406030204" pitchFamily="18" charset="0"/>
+                        </a:rPr>
+                        <m:t>𝑝𝑎𝑟𝑎𝑚𝑒𝑡𝑒𝑟𝑠</m:t>
+                      </m:r>
+                      <m:r>
+                        <a:rPr lang="en-US" b="0" i="1" smtClean="0">
+                          <a:latin typeface="Cambria Math" panose="02040503050406030204" pitchFamily="18" charset="0"/>
+                        </a:rPr>
+                        <m:t> ~ </m:t>
+                      </m:r>
+                      <m:r>
+                        <a:rPr lang="en-US" b="0" i="1" smtClean="0">
+                          <a:latin typeface="Cambria Math" panose="02040503050406030204" pitchFamily="18" charset="0"/>
+                        </a:rPr>
+                        <m:t>𝑟𝑒𝑠𝑢𝑙𝑡𝑠</m:t>
+                      </m:r>
+                    </m:oMath>
+                  </m:oMathPara>
+                </a14:m>
+                <a:endParaRPr lang="en-US" dirty="0"/>
+              </a:p>
+            </p:txBody>
+          </p:sp>
+        </mc:Choice>
+        <mc:Fallback>
+          <p:sp>
+            <p:nvSpPr>
+              <p:cNvPr id="6" name="TextBox 5">
+                <a:extLst>
+                  <a:ext uri="{FF2B5EF4-FFF2-40B4-BE49-F238E27FC236}">
+                    <a16:creationId xmlns:a16="http://schemas.microsoft.com/office/drawing/2014/main" id="{FDAE5A0E-5B87-97FB-F45F-5E400B35ACA5}"/>
+                  </a:ext>
+                </a:extLst>
+              </p:cNvPr>
+              <p:cNvSpPr txBox="1">
+                <a:spLocks noRot="1" noChangeAspect="1" noMove="1" noResize="1" noEditPoints="1" noAdjustHandles="1" noChangeArrowheads="1" noChangeShapeType="1" noTextEdit="1"/>
+              </p:cNvSpPr>
+              <p:nvPr/>
+            </p:nvSpPr>
+            <p:spPr>
+              <a:xfrm>
+                <a:off x="651229" y="2704629"/>
+                <a:ext cx="2330095" cy="646331"/>
+              </a:xfrm>
+              <a:prstGeom prst="rect">
+                <a:avLst/>
+              </a:prstGeom>
+              <a:blipFill>
+                <a:blip r:embed="rId4"/>
+                <a:stretch>
+                  <a:fillRect l="-2174" t="-5882" r="-2717" b="-9804"/>
+                </a:stretch>
+              </a:blipFill>
+            </p:spPr>
+            <p:txBody>
+              <a:bodyPr/>
+              <a:lstStyle/>
+              <a:p>
+                <a:r>
+                  <a:rPr lang="en-US">
+                    <a:noFill/>
+                  </a:rPr>
+                  <a:t> </a:t>
+                </a:r>
+              </a:p>
+            </p:txBody>
+          </p:sp>
+        </mc:Fallback>
+      </mc:AlternateContent>
+      <p:pic>
+        <p:nvPicPr>
+          <p:cNvPr id="8" name="Graphic 7" descr="Table with solid fill">
+            <a:extLst>
+              <a:ext uri="{FF2B5EF4-FFF2-40B4-BE49-F238E27FC236}">
+                <a16:creationId xmlns:a16="http://schemas.microsoft.com/office/drawing/2014/main" id="{3F869F2C-3224-BA04-EEE9-892897AECC7B}"/>
+              </a:ext>
+            </a:extLst>
+          </p:cNvPr>
+          <p:cNvPicPr>
+            <a:picLocks noChangeAspect="1"/>
+          </p:cNvPicPr>
+          <p:nvPr/>
+        </p:nvPicPr>
+        <p:blipFill>
+          <a:blip r:embed="rId5">
+            <a:extLst>
+              <a:ext uri="{96DAC541-7B7A-43D3-8B79-37D633B846F1}">
+                <asvg:svgBlip xmlns:asvg="http://schemas.microsoft.com/office/drawing/2016/SVG/main" r:embed="rId6"/>
+              </a:ext>
+            </a:extLst>
+          </a:blip>
+          <a:stretch>
+            <a:fillRect/>
+          </a:stretch>
+        </p:blipFill>
+        <p:spPr>
+          <a:xfrm>
+            <a:off x="4114800" y="1587781"/>
+            <a:ext cx="914400" cy="914400"/>
+          </a:xfrm>
+          <a:prstGeom prst="rect">
+            <a:avLst/>
+          </a:prstGeom>
+        </p:spPr>
+      </p:pic>
+      <p:sp>
+        <p:nvSpPr>
+          <p:cNvPr id="11" name="TextBox 10">
+            <a:extLst>
+              <a:ext uri="{FF2B5EF4-FFF2-40B4-BE49-F238E27FC236}">
+                <a16:creationId xmlns:a16="http://schemas.microsoft.com/office/drawing/2014/main" id="{D260909A-FAE1-3164-F402-B901883F17BD}"/>
+              </a:ext>
+            </a:extLst>
+          </p:cNvPr>
+          <p:cNvSpPr txBox="1"/>
+          <p:nvPr/>
+        </p:nvSpPr>
+        <p:spPr>
+          <a:xfrm>
+            <a:off x="3666752" y="1026143"/>
+            <a:ext cx="1810496" cy="615553"/>
+          </a:xfrm>
+          <a:prstGeom prst="rect">
+            <a:avLst/>
+          </a:prstGeom>
+          <a:noFill/>
+        </p:spPr>
+        <p:txBody>
+          <a:bodyPr wrap="none" rtlCol="0">
+            <a:spAutoFit/>
+          </a:bodyPr>
+          <a:lstStyle/>
+          <a:p>
+            <a:pPr algn="ctr"/>
+            <a:r>
+              <a:rPr lang="en-US" dirty="0"/>
+              <a:t>Input parameters</a:t>
+            </a:r>
+            <a:br>
+              <a:rPr lang="en-US" dirty="0"/>
+            </a:br>
+            <a:r>
+              <a:rPr lang="en-US" sz="1600" dirty="0"/>
+              <a:t>(</a:t>
+            </a:r>
+            <a:r>
+              <a:rPr lang="en-US" sz="1600" i="1" dirty="0"/>
+              <a:t>m, v, J, </a:t>
+            </a:r>
+            <a:r>
+              <a:rPr lang="en-US" sz="1600" i="1" dirty="0" err="1"/>
+              <a:t>Jm</a:t>
+            </a:r>
+            <a:r>
+              <a:rPr lang="en-US" sz="1600" i="1" dirty="0"/>
+              <a:t>, </a:t>
+            </a:r>
+            <a:r>
+              <a:rPr lang="en-US" sz="1600" i="1" dirty="0" err="1"/>
+              <a:t>Sm</a:t>
+            </a:r>
+            <a:r>
+              <a:rPr lang="en-US" sz="1600" i="1" dirty="0"/>
+              <a:t>)</a:t>
+            </a:r>
+            <a:endParaRPr lang="en-US" dirty="0"/>
+          </a:p>
+        </p:txBody>
+      </p:sp>
+      <p:pic>
+        <p:nvPicPr>
+          <p:cNvPr id="12" name="Graphic 11" descr="Table with solid fill">
+            <a:extLst>
+              <a:ext uri="{FF2B5EF4-FFF2-40B4-BE49-F238E27FC236}">
+                <a16:creationId xmlns:a16="http://schemas.microsoft.com/office/drawing/2014/main" id="{734934BB-B229-8F2E-A468-0D0003AEED68}"/>
+              </a:ext>
+            </a:extLst>
+          </p:cNvPr>
+          <p:cNvPicPr>
+            <a:picLocks noChangeAspect="1"/>
+          </p:cNvPicPr>
+          <p:nvPr/>
+        </p:nvPicPr>
+        <p:blipFill>
+          <a:blip r:embed="rId7">
+            <a:extLst>
+              <a:ext uri="{96DAC541-7B7A-43D3-8B79-37D633B846F1}">
+                <asvg:svgBlip xmlns:asvg="http://schemas.microsoft.com/office/drawing/2016/SVG/main" r:embed="rId8"/>
+              </a:ext>
+            </a:extLst>
+          </a:blip>
+          <a:stretch>
+            <a:fillRect/>
+          </a:stretch>
+        </p:blipFill>
+        <p:spPr>
+          <a:xfrm>
+            <a:off x="6804687" y="1582413"/>
+            <a:ext cx="914400" cy="914400"/>
+          </a:xfrm>
+          <a:prstGeom prst="rect">
+            <a:avLst/>
+          </a:prstGeom>
+        </p:spPr>
+      </p:pic>
+      <p:sp>
+        <p:nvSpPr>
+          <p:cNvPr id="13" name="TextBox 12">
+            <a:extLst>
+              <a:ext uri="{FF2B5EF4-FFF2-40B4-BE49-F238E27FC236}">
+                <a16:creationId xmlns:a16="http://schemas.microsoft.com/office/drawing/2014/main" id="{CC0597F6-C898-5DD7-5A09-F77BEAC3F02C}"/>
+              </a:ext>
+            </a:extLst>
+          </p:cNvPr>
+          <p:cNvSpPr txBox="1"/>
+          <p:nvPr/>
+        </p:nvSpPr>
+        <p:spPr>
+          <a:xfrm>
+            <a:off x="6352899" y="1020775"/>
+            <a:ext cx="1938223" cy="615553"/>
+          </a:xfrm>
+          <a:prstGeom prst="rect">
+            <a:avLst/>
+          </a:prstGeom>
+          <a:noFill/>
+        </p:spPr>
+        <p:txBody>
+          <a:bodyPr wrap="none" rtlCol="0">
+            <a:spAutoFit/>
+          </a:bodyPr>
+          <a:lstStyle/>
+          <a:p>
+            <a:pPr algn="ctr"/>
+            <a:r>
+              <a:rPr lang="en-US" dirty="0">
+                <a:solidFill>
+                  <a:schemeClr val="accent4"/>
+                </a:solidFill>
+              </a:rPr>
+              <a:t>Outcome variables</a:t>
+            </a:r>
+          </a:p>
+          <a:p>
+            <a:pPr algn="ctr"/>
+            <a:r>
+              <a:rPr lang="en-US" sz="1600" dirty="0">
+                <a:solidFill>
+                  <a:schemeClr val="accent4"/>
+                </a:solidFill>
+              </a:rPr>
+              <a:t>(hill0, hill1, hill2)</a:t>
+            </a:r>
+          </a:p>
+        </p:txBody>
+      </p:sp>
+      <p:pic>
+        <p:nvPicPr>
+          <p:cNvPr id="14" name="Graphic 13" descr="Table with solid fill">
+            <a:extLst>
+              <a:ext uri="{FF2B5EF4-FFF2-40B4-BE49-F238E27FC236}">
+                <a16:creationId xmlns:a16="http://schemas.microsoft.com/office/drawing/2014/main" id="{520D0D51-2D7F-C854-B243-EDBC4CDF38AA}"/>
+              </a:ext>
+            </a:extLst>
+          </p:cNvPr>
+          <p:cNvPicPr>
+            <a:picLocks noChangeAspect="1"/>
+          </p:cNvPicPr>
+          <p:nvPr/>
+        </p:nvPicPr>
+        <p:blipFill>
+          <a:blip r:embed="rId7">
+            <a:extLst>
+              <a:ext uri="{96DAC541-7B7A-43D3-8B79-37D633B846F1}">
+                <asvg:svgBlip xmlns:asvg="http://schemas.microsoft.com/office/drawing/2016/SVG/main" r:embed="rId8"/>
+              </a:ext>
+            </a:extLst>
+          </a:blip>
+          <a:stretch>
+            <a:fillRect/>
+          </a:stretch>
+        </p:blipFill>
+        <p:spPr>
+          <a:xfrm>
+            <a:off x="4109271" y="2970424"/>
+            <a:ext cx="914400" cy="914400"/>
+          </a:xfrm>
+          <a:prstGeom prst="rect">
+            <a:avLst/>
+          </a:prstGeom>
+        </p:spPr>
+      </p:pic>
+      <p:sp>
+        <p:nvSpPr>
+          <p:cNvPr id="15" name="TextBox 14">
+            <a:extLst>
+              <a:ext uri="{FF2B5EF4-FFF2-40B4-BE49-F238E27FC236}">
+                <a16:creationId xmlns:a16="http://schemas.microsoft.com/office/drawing/2014/main" id="{1C5DD975-80F7-D344-306D-0F80E0ED0768}"/>
+              </a:ext>
+            </a:extLst>
+          </p:cNvPr>
+          <p:cNvSpPr txBox="1"/>
+          <p:nvPr/>
+        </p:nvSpPr>
+        <p:spPr>
+          <a:xfrm>
+            <a:off x="3602888" y="2445872"/>
+            <a:ext cx="1938223" cy="615553"/>
+          </a:xfrm>
+          <a:prstGeom prst="rect">
+            <a:avLst/>
+          </a:prstGeom>
+          <a:noFill/>
+        </p:spPr>
+        <p:txBody>
+          <a:bodyPr wrap="none" rtlCol="0">
+            <a:spAutoFit/>
+          </a:bodyPr>
+          <a:lstStyle/>
+          <a:p>
+            <a:pPr algn="ctr"/>
+            <a:r>
+              <a:rPr lang="en-US" dirty="0">
+                <a:solidFill>
+                  <a:schemeClr val="accent4"/>
+                </a:solidFill>
+              </a:rPr>
+              <a:t>Outcome variables</a:t>
+            </a:r>
+          </a:p>
+          <a:p>
+            <a:pPr algn="ctr"/>
+            <a:r>
+              <a:rPr lang="en-US" sz="1600" dirty="0">
+                <a:solidFill>
+                  <a:schemeClr val="accent4"/>
+                </a:solidFill>
+              </a:rPr>
+              <a:t>(hill0, hill1, hill2)</a:t>
+            </a:r>
+          </a:p>
+        </p:txBody>
+      </p:sp>
+      <p:sp>
+        <p:nvSpPr>
+          <p:cNvPr id="16" name="TextBox 15">
+            <a:extLst>
+              <a:ext uri="{FF2B5EF4-FFF2-40B4-BE49-F238E27FC236}">
+                <a16:creationId xmlns:a16="http://schemas.microsoft.com/office/drawing/2014/main" id="{9107F7C1-AC6D-2494-6328-E9C8F93AA63C}"/>
+              </a:ext>
+            </a:extLst>
+          </p:cNvPr>
+          <p:cNvSpPr txBox="1"/>
+          <p:nvPr/>
+        </p:nvSpPr>
+        <p:spPr>
+          <a:xfrm>
+            <a:off x="5477248" y="1705523"/>
+            <a:ext cx="961610" cy="369332"/>
+          </a:xfrm>
+          <a:prstGeom prst="rect">
+            <a:avLst/>
+          </a:prstGeom>
+          <a:noFill/>
+        </p:spPr>
+        <p:txBody>
+          <a:bodyPr wrap="none" rtlCol="0">
+            <a:spAutoFit/>
+          </a:bodyPr>
+          <a:lstStyle/>
+          <a:p>
+            <a:r>
+              <a:rPr lang="en-US" dirty="0"/>
+              <a:t>produce</a:t>
+            </a:r>
+          </a:p>
+        </p:txBody>
+      </p:sp>
+      <p:pic>
+        <p:nvPicPr>
+          <p:cNvPr id="19" name="Graphic 18" descr="Table with solid fill">
+            <a:extLst>
+              <a:ext uri="{FF2B5EF4-FFF2-40B4-BE49-F238E27FC236}">
+                <a16:creationId xmlns:a16="http://schemas.microsoft.com/office/drawing/2014/main" id="{AAA082ED-18A5-2C6F-61CD-B0986AA5716E}"/>
+              </a:ext>
+            </a:extLst>
+          </p:cNvPr>
+          <p:cNvPicPr>
+            <a:picLocks noChangeAspect="1"/>
+          </p:cNvPicPr>
+          <p:nvPr/>
+        </p:nvPicPr>
+        <p:blipFill>
+          <a:blip r:embed="rId5">
+            <a:extLst>
+              <a:ext uri="{96DAC541-7B7A-43D3-8B79-37D633B846F1}">
+                <asvg:svgBlip xmlns:asvg="http://schemas.microsoft.com/office/drawing/2016/SVG/main" r:embed="rId6"/>
+              </a:ext>
+            </a:extLst>
+          </a:blip>
+          <a:stretch>
+            <a:fillRect/>
+          </a:stretch>
+        </p:blipFill>
+        <p:spPr>
+          <a:xfrm>
+            <a:off x="6800947" y="2970424"/>
+            <a:ext cx="914400" cy="914400"/>
+          </a:xfrm>
+          <a:prstGeom prst="rect">
+            <a:avLst/>
+          </a:prstGeom>
+        </p:spPr>
+      </p:pic>
+      <p:sp>
+        <p:nvSpPr>
+          <p:cNvPr id="20" name="TextBox 19">
+            <a:extLst>
+              <a:ext uri="{FF2B5EF4-FFF2-40B4-BE49-F238E27FC236}">
+                <a16:creationId xmlns:a16="http://schemas.microsoft.com/office/drawing/2014/main" id="{DADA7436-A6AF-3BA5-BFB5-5C443A373F8C}"/>
+              </a:ext>
+            </a:extLst>
+          </p:cNvPr>
+          <p:cNvSpPr txBox="1"/>
+          <p:nvPr/>
+        </p:nvSpPr>
+        <p:spPr>
+          <a:xfrm>
+            <a:off x="6352899" y="2459824"/>
+            <a:ext cx="1810496" cy="615553"/>
+          </a:xfrm>
+          <a:prstGeom prst="rect">
+            <a:avLst/>
+          </a:prstGeom>
+          <a:noFill/>
+        </p:spPr>
+        <p:txBody>
+          <a:bodyPr wrap="none" rtlCol="0">
+            <a:spAutoFit/>
+          </a:bodyPr>
+          <a:lstStyle/>
+          <a:p>
+            <a:pPr algn="ctr"/>
+            <a:r>
+              <a:rPr lang="en-US" dirty="0"/>
+              <a:t>Input parameters</a:t>
+            </a:r>
+            <a:br>
+              <a:rPr lang="en-US" dirty="0"/>
+            </a:br>
+            <a:r>
+              <a:rPr lang="en-US" sz="1600" dirty="0"/>
+              <a:t>(</a:t>
+            </a:r>
+            <a:r>
+              <a:rPr lang="en-US" sz="1600" i="1" dirty="0"/>
+              <a:t>m, v, J, </a:t>
+            </a:r>
+            <a:r>
+              <a:rPr lang="en-US" sz="1600" i="1" dirty="0" err="1"/>
+              <a:t>Jm</a:t>
+            </a:r>
+            <a:r>
+              <a:rPr lang="en-US" sz="1600" i="1" dirty="0"/>
+              <a:t>, </a:t>
+            </a:r>
+            <a:r>
+              <a:rPr lang="en-US" sz="1600" i="1" dirty="0" err="1"/>
+              <a:t>Sm</a:t>
+            </a:r>
+            <a:r>
+              <a:rPr lang="en-US" sz="1600" i="1" dirty="0"/>
+              <a:t>)</a:t>
+            </a:r>
+            <a:endParaRPr lang="en-US" dirty="0"/>
+          </a:p>
+        </p:txBody>
+      </p:sp>
+      <p:pic>
+        <p:nvPicPr>
+          <p:cNvPr id="21" name="Graphic 20" descr="Arrow Right with solid fill">
+            <a:extLst>
+              <a:ext uri="{FF2B5EF4-FFF2-40B4-BE49-F238E27FC236}">
+                <a16:creationId xmlns:a16="http://schemas.microsoft.com/office/drawing/2014/main" id="{F0DD0248-5EA6-57A2-21DE-EEA6A092FD10}"/>
+              </a:ext>
+            </a:extLst>
+          </p:cNvPr>
+          <p:cNvPicPr>
+            <a:picLocks noChangeAspect="1"/>
+          </p:cNvPicPr>
+          <p:nvPr/>
+        </p:nvPicPr>
+        <p:blipFill>
+          <a:blip r:embed="rId2">
+            <a:extLst>
+              <a:ext uri="{96DAC541-7B7A-43D3-8B79-37D633B846F1}">
+                <asvg:svgBlip xmlns:asvg="http://schemas.microsoft.com/office/drawing/2016/SVG/main" r:embed="rId3"/>
+              </a:ext>
+            </a:extLst>
+          </a:blip>
+          <a:stretch>
+            <a:fillRect/>
+          </a:stretch>
+        </p:blipFill>
+        <p:spPr>
+          <a:xfrm>
+            <a:off x="5592336" y="3021462"/>
+            <a:ext cx="731433" cy="731433"/>
+          </a:xfrm>
+          <a:prstGeom prst="rect">
+            <a:avLst/>
+          </a:prstGeom>
+        </p:spPr>
+      </p:pic>
+      <p:sp>
+        <p:nvSpPr>
+          <p:cNvPr id="22" name="TextBox 21">
+            <a:extLst>
+              <a:ext uri="{FF2B5EF4-FFF2-40B4-BE49-F238E27FC236}">
+                <a16:creationId xmlns:a16="http://schemas.microsoft.com/office/drawing/2014/main" id="{904BF611-101D-AB20-487E-95AE0EBE58F8}"/>
+              </a:ext>
+            </a:extLst>
+          </p:cNvPr>
+          <p:cNvSpPr txBox="1"/>
+          <p:nvPr/>
+        </p:nvSpPr>
+        <p:spPr>
+          <a:xfrm>
+            <a:off x="5495436" y="2937669"/>
+            <a:ext cx="848502" cy="369332"/>
+          </a:xfrm>
+          <a:prstGeom prst="rect">
+            <a:avLst/>
+          </a:prstGeom>
+          <a:noFill/>
+        </p:spPr>
+        <p:txBody>
+          <a:bodyPr wrap="none" rtlCol="0">
+            <a:spAutoFit/>
+          </a:bodyPr>
+          <a:lstStyle/>
+          <a:p>
+            <a:r>
+              <a:rPr lang="en-US" dirty="0"/>
+              <a:t>predict</a:t>
             </a:r>
           </a:p>
         </p:txBody>
       </p:sp>
     </p:spTree>
+    <p:extLst>
+      <p:ext uri="{BB962C8B-B14F-4D97-AF65-F5344CB8AC3E}">
+        <p14:creationId xmlns:p14="http://schemas.microsoft.com/office/powerpoint/2010/main" val="548401670"/>
+      </p:ext>
+    </p:extLst>
+  </p:cSld>
+  <p:clrMapOvr>
+    <a:masterClrMapping/>
+  </p:clrMapOvr>
+</p:sld>
+</file>
+
+<file path=ppt/slides/slide56.xml><?xml version="1.0" encoding="utf-8"?>
+<p:sld xmlns:a="http://schemas.openxmlformats.org/drawingml/2006/main" xmlns:r="http://schemas.openxmlformats.org/officeDocument/2006/relationships" xmlns:p="http://schemas.openxmlformats.org/presentationml/2006/main">
+  <p:cSld>
+    <p:spTree>
+      <p:nvGrpSpPr>
+        <p:cNvPr id="1" name=""/>
+        <p:cNvGrpSpPr/>
+        <p:nvPr/>
+      </p:nvGrpSpPr>
+      <p:grpSpPr>
+        <a:xfrm>
+          <a:off x="0" y="0"/>
+          <a:ext cx="0" cy="0"/>
+          <a:chOff x="0" y="0"/>
+          <a:chExt cx="0" cy="0"/>
+        </a:xfrm>
+      </p:grpSpPr>
+      <p:pic>
+        <p:nvPicPr>
+          <p:cNvPr id="18" name="Graphic 17" descr="Arrow Right with solid fill">
+            <a:extLst>
+              <a:ext uri="{FF2B5EF4-FFF2-40B4-BE49-F238E27FC236}">
+                <a16:creationId xmlns:a16="http://schemas.microsoft.com/office/drawing/2014/main" id="{78246A6F-83C5-D181-47AF-3D2C3BDA7214}"/>
+              </a:ext>
+            </a:extLst>
+          </p:cNvPr>
+          <p:cNvPicPr>
+            <a:picLocks noChangeAspect="1"/>
+          </p:cNvPicPr>
+          <p:nvPr/>
+        </p:nvPicPr>
+        <p:blipFill>
+          <a:blip r:embed="rId2">
+            <a:extLst>
+              <a:ext uri="{96DAC541-7B7A-43D3-8B79-37D633B846F1}">
+                <asvg:svgBlip xmlns:asvg="http://schemas.microsoft.com/office/drawing/2016/SVG/main" r:embed="rId3"/>
+              </a:ext>
+            </a:extLst>
+          </a:blip>
+          <a:stretch>
+            <a:fillRect/>
+          </a:stretch>
+        </p:blipFill>
+        <p:spPr>
+          <a:xfrm>
+            <a:off x="5592336" y="1760185"/>
+            <a:ext cx="731433" cy="731433"/>
+          </a:xfrm>
+          <a:prstGeom prst="rect">
+            <a:avLst/>
+          </a:prstGeom>
+        </p:spPr>
+      </p:pic>
+      <p:sp>
+        <p:nvSpPr>
+          <p:cNvPr id="2" name="Title 1">
+            <a:extLst>
+              <a:ext uri="{FF2B5EF4-FFF2-40B4-BE49-F238E27FC236}">
+                <a16:creationId xmlns:a16="http://schemas.microsoft.com/office/drawing/2014/main" id="{CCA19E68-E74E-29A0-3D88-7D4756F3637F}"/>
+              </a:ext>
+            </a:extLst>
+          </p:cNvPr>
+          <p:cNvSpPr>
+            <a:spLocks noGrp="1"/>
+          </p:cNvSpPr>
+          <p:nvPr>
+            <p:ph type="title"/>
+          </p:nvPr>
+        </p:nvSpPr>
+        <p:spPr/>
+        <p:txBody>
+          <a:bodyPr/>
+          <a:lstStyle/>
+          <a:p>
+            <a:r>
+              <a:rPr lang="en-US" dirty="0"/>
+              <a:t>The (general) model structure</a:t>
+            </a:r>
+          </a:p>
+        </p:txBody>
+      </p:sp>
+      <p:sp>
+        <p:nvSpPr>
+          <p:cNvPr id="5" name="TextBox 4">
+            <a:extLst>
+              <a:ext uri="{FF2B5EF4-FFF2-40B4-BE49-F238E27FC236}">
+                <a16:creationId xmlns:a16="http://schemas.microsoft.com/office/drawing/2014/main" id="{B90473A7-02C2-495E-732E-ED806708C1A3}"/>
+              </a:ext>
+            </a:extLst>
+          </p:cNvPr>
+          <p:cNvSpPr txBox="1"/>
+          <p:nvPr/>
+        </p:nvSpPr>
+        <p:spPr>
+          <a:xfrm>
+            <a:off x="651230" y="1205441"/>
+            <a:ext cx="2330095" cy="923330"/>
+          </a:xfrm>
+          <a:prstGeom prst="rect">
+            <a:avLst/>
+          </a:prstGeom>
+          <a:noFill/>
+        </p:spPr>
+        <p:txBody>
+          <a:bodyPr wrap="square" rtlCol="0">
+            <a:spAutoFit/>
+          </a:bodyPr>
+          <a:lstStyle/>
+          <a:p>
+            <a:pPr algn="ctr"/>
+            <a:r>
+              <a:rPr lang="en-US" dirty="0"/>
+              <a:t>Run simulations over a wide range of parameter settings.</a:t>
+            </a:r>
+          </a:p>
+        </p:txBody>
+      </p:sp>
+      <mc:AlternateContent xmlns:mc="http://schemas.openxmlformats.org/markup-compatibility/2006">
+        <mc:Choice xmlns:a14="http://schemas.microsoft.com/office/drawing/2010/main" Requires="a14">
+          <p:sp>
+            <p:nvSpPr>
+              <p:cNvPr id="6" name="TextBox 5">
+                <a:extLst>
+                  <a:ext uri="{FF2B5EF4-FFF2-40B4-BE49-F238E27FC236}">
+                    <a16:creationId xmlns:a16="http://schemas.microsoft.com/office/drawing/2014/main" id="{FDAE5A0E-5B87-97FB-F45F-5E400B35ACA5}"/>
+                  </a:ext>
+                </a:extLst>
+              </p:cNvPr>
+              <p:cNvSpPr txBox="1"/>
+              <p:nvPr/>
+            </p:nvSpPr>
+            <p:spPr>
+              <a:xfrm>
+                <a:off x="651229" y="2704629"/>
+                <a:ext cx="2330095" cy="646331"/>
+              </a:xfrm>
+              <a:prstGeom prst="rect">
+                <a:avLst/>
+              </a:prstGeom>
+              <a:noFill/>
+            </p:spPr>
+            <p:txBody>
+              <a:bodyPr wrap="square" rtlCol="0">
+                <a:spAutoFit/>
+              </a:bodyPr>
+              <a:lstStyle/>
+              <a:p>
+                <a:pPr algn="ctr"/>
+                <a:r>
+                  <a:rPr lang="en-US" dirty="0"/>
+                  <a:t>Fit a model of the form</a:t>
+                </a:r>
+              </a:p>
+              <a:p>
+                <a:pPr algn="ctr"/>
+                <a14:m>
+                  <m:oMathPara xmlns:m="http://schemas.openxmlformats.org/officeDocument/2006/math">
+                    <m:oMathParaPr>
+                      <m:jc m:val="centerGroup"/>
+                    </m:oMathParaPr>
+                    <m:oMath xmlns:m="http://schemas.openxmlformats.org/officeDocument/2006/math">
+                      <m:r>
+                        <a:rPr lang="en-US" b="0" i="1" smtClean="0">
+                          <a:latin typeface="Cambria Math" panose="02040503050406030204" pitchFamily="18" charset="0"/>
+                        </a:rPr>
+                        <m:t>𝑝𝑎𝑟𝑎𝑚𝑒𝑡𝑒𝑟𝑠</m:t>
+                      </m:r>
+                      <m:r>
+                        <a:rPr lang="en-US" b="0" i="1" smtClean="0">
+                          <a:latin typeface="Cambria Math" panose="02040503050406030204" pitchFamily="18" charset="0"/>
+                        </a:rPr>
+                        <m:t> ~ </m:t>
+                      </m:r>
+                      <m:r>
+                        <a:rPr lang="en-US" b="0" i="1" smtClean="0">
+                          <a:latin typeface="Cambria Math" panose="02040503050406030204" pitchFamily="18" charset="0"/>
+                        </a:rPr>
+                        <m:t>𝑟𝑒𝑠𝑢𝑙𝑡𝑠</m:t>
+                      </m:r>
+                    </m:oMath>
+                  </m:oMathPara>
+                </a14:m>
+                <a:endParaRPr lang="en-US" dirty="0"/>
+              </a:p>
+            </p:txBody>
+          </p:sp>
+        </mc:Choice>
+        <mc:Fallback>
+          <p:sp>
+            <p:nvSpPr>
+              <p:cNvPr id="6" name="TextBox 5">
+                <a:extLst>
+                  <a:ext uri="{FF2B5EF4-FFF2-40B4-BE49-F238E27FC236}">
+                    <a16:creationId xmlns:a16="http://schemas.microsoft.com/office/drawing/2014/main" id="{FDAE5A0E-5B87-97FB-F45F-5E400B35ACA5}"/>
+                  </a:ext>
+                </a:extLst>
+              </p:cNvPr>
+              <p:cNvSpPr txBox="1">
+                <a:spLocks noRot="1" noChangeAspect="1" noMove="1" noResize="1" noEditPoints="1" noAdjustHandles="1" noChangeArrowheads="1" noChangeShapeType="1" noTextEdit="1"/>
+              </p:cNvSpPr>
+              <p:nvPr/>
+            </p:nvSpPr>
+            <p:spPr>
+              <a:xfrm>
+                <a:off x="651229" y="2704629"/>
+                <a:ext cx="2330095" cy="646331"/>
+              </a:xfrm>
+              <a:prstGeom prst="rect">
+                <a:avLst/>
+              </a:prstGeom>
+              <a:blipFill>
+                <a:blip r:embed="rId4"/>
+                <a:stretch>
+                  <a:fillRect l="-2174" t="-5882" r="-2717" b="-9804"/>
+                </a:stretch>
+              </a:blipFill>
+            </p:spPr>
+            <p:txBody>
+              <a:bodyPr/>
+              <a:lstStyle/>
+              <a:p>
+                <a:r>
+                  <a:rPr lang="en-US">
+                    <a:noFill/>
+                  </a:rPr>
+                  <a:t> </a:t>
+                </a:r>
+              </a:p>
+            </p:txBody>
+          </p:sp>
+        </mc:Fallback>
+      </mc:AlternateContent>
+      <p:pic>
+        <p:nvPicPr>
+          <p:cNvPr id="8" name="Graphic 7" descr="Table with solid fill">
+            <a:extLst>
+              <a:ext uri="{FF2B5EF4-FFF2-40B4-BE49-F238E27FC236}">
+                <a16:creationId xmlns:a16="http://schemas.microsoft.com/office/drawing/2014/main" id="{3F869F2C-3224-BA04-EEE9-892897AECC7B}"/>
+              </a:ext>
+            </a:extLst>
+          </p:cNvPr>
+          <p:cNvPicPr>
+            <a:picLocks noChangeAspect="1"/>
+          </p:cNvPicPr>
+          <p:nvPr/>
+        </p:nvPicPr>
+        <p:blipFill>
+          <a:blip r:embed="rId5">
+            <a:extLst>
+              <a:ext uri="{96DAC541-7B7A-43D3-8B79-37D633B846F1}">
+                <asvg:svgBlip xmlns:asvg="http://schemas.microsoft.com/office/drawing/2016/SVG/main" r:embed="rId6"/>
+              </a:ext>
+            </a:extLst>
+          </a:blip>
+          <a:stretch>
+            <a:fillRect/>
+          </a:stretch>
+        </p:blipFill>
+        <p:spPr>
+          <a:xfrm>
+            <a:off x="4114800" y="1587781"/>
+            <a:ext cx="914400" cy="914400"/>
+          </a:xfrm>
+          <a:prstGeom prst="rect">
+            <a:avLst/>
+          </a:prstGeom>
+        </p:spPr>
+      </p:pic>
+      <p:sp>
+        <p:nvSpPr>
+          <p:cNvPr id="11" name="TextBox 10">
+            <a:extLst>
+              <a:ext uri="{FF2B5EF4-FFF2-40B4-BE49-F238E27FC236}">
+                <a16:creationId xmlns:a16="http://schemas.microsoft.com/office/drawing/2014/main" id="{D260909A-FAE1-3164-F402-B901883F17BD}"/>
+              </a:ext>
+            </a:extLst>
+          </p:cNvPr>
+          <p:cNvSpPr txBox="1"/>
+          <p:nvPr/>
+        </p:nvSpPr>
+        <p:spPr>
+          <a:xfrm>
+            <a:off x="3666752" y="1026143"/>
+            <a:ext cx="1810496" cy="615553"/>
+          </a:xfrm>
+          <a:prstGeom prst="rect">
+            <a:avLst/>
+          </a:prstGeom>
+          <a:noFill/>
+        </p:spPr>
+        <p:txBody>
+          <a:bodyPr wrap="none" rtlCol="0">
+            <a:spAutoFit/>
+          </a:bodyPr>
+          <a:lstStyle/>
+          <a:p>
+            <a:pPr algn="ctr"/>
+            <a:r>
+              <a:rPr lang="en-US" dirty="0"/>
+              <a:t>Input parameters</a:t>
+            </a:r>
+            <a:br>
+              <a:rPr lang="en-US" dirty="0"/>
+            </a:br>
+            <a:r>
+              <a:rPr lang="en-US" sz="1600" dirty="0"/>
+              <a:t>(</a:t>
+            </a:r>
+            <a:r>
+              <a:rPr lang="en-US" sz="1600" i="1" dirty="0"/>
+              <a:t>m, v, J, </a:t>
+            </a:r>
+            <a:r>
+              <a:rPr lang="en-US" sz="1600" i="1" dirty="0" err="1"/>
+              <a:t>Jm</a:t>
+            </a:r>
+            <a:r>
+              <a:rPr lang="en-US" sz="1600" i="1" dirty="0"/>
+              <a:t>, </a:t>
+            </a:r>
+            <a:r>
+              <a:rPr lang="en-US" sz="1600" i="1" dirty="0" err="1"/>
+              <a:t>Sm</a:t>
+            </a:r>
+            <a:r>
+              <a:rPr lang="en-US" sz="1600" i="1" dirty="0"/>
+              <a:t>)</a:t>
+            </a:r>
+            <a:endParaRPr lang="en-US" dirty="0"/>
+          </a:p>
+        </p:txBody>
+      </p:sp>
+      <p:pic>
+        <p:nvPicPr>
+          <p:cNvPr id="12" name="Graphic 11" descr="Table with solid fill">
+            <a:extLst>
+              <a:ext uri="{FF2B5EF4-FFF2-40B4-BE49-F238E27FC236}">
+                <a16:creationId xmlns:a16="http://schemas.microsoft.com/office/drawing/2014/main" id="{734934BB-B229-8F2E-A468-0D0003AEED68}"/>
+              </a:ext>
+            </a:extLst>
+          </p:cNvPr>
+          <p:cNvPicPr>
+            <a:picLocks noChangeAspect="1"/>
+          </p:cNvPicPr>
+          <p:nvPr/>
+        </p:nvPicPr>
+        <p:blipFill>
+          <a:blip r:embed="rId7">
+            <a:extLst>
+              <a:ext uri="{96DAC541-7B7A-43D3-8B79-37D633B846F1}">
+                <asvg:svgBlip xmlns:asvg="http://schemas.microsoft.com/office/drawing/2016/SVG/main" r:embed="rId8"/>
+              </a:ext>
+            </a:extLst>
+          </a:blip>
+          <a:stretch>
+            <a:fillRect/>
+          </a:stretch>
+        </p:blipFill>
+        <p:spPr>
+          <a:xfrm>
+            <a:off x="6804687" y="1582413"/>
+            <a:ext cx="914400" cy="914400"/>
+          </a:xfrm>
+          <a:prstGeom prst="rect">
+            <a:avLst/>
+          </a:prstGeom>
+        </p:spPr>
+      </p:pic>
+      <p:sp>
+        <p:nvSpPr>
+          <p:cNvPr id="13" name="TextBox 12">
+            <a:extLst>
+              <a:ext uri="{FF2B5EF4-FFF2-40B4-BE49-F238E27FC236}">
+                <a16:creationId xmlns:a16="http://schemas.microsoft.com/office/drawing/2014/main" id="{CC0597F6-C898-5DD7-5A09-F77BEAC3F02C}"/>
+              </a:ext>
+            </a:extLst>
+          </p:cNvPr>
+          <p:cNvSpPr txBox="1"/>
+          <p:nvPr/>
+        </p:nvSpPr>
+        <p:spPr>
+          <a:xfrm>
+            <a:off x="6352899" y="1020775"/>
+            <a:ext cx="1938223" cy="615553"/>
+          </a:xfrm>
+          <a:prstGeom prst="rect">
+            <a:avLst/>
+          </a:prstGeom>
+          <a:noFill/>
+        </p:spPr>
+        <p:txBody>
+          <a:bodyPr wrap="none" rtlCol="0">
+            <a:spAutoFit/>
+          </a:bodyPr>
+          <a:lstStyle/>
+          <a:p>
+            <a:pPr algn="ctr"/>
+            <a:r>
+              <a:rPr lang="en-US" dirty="0">
+                <a:solidFill>
+                  <a:schemeClr val="accent4"/>
+                </a:solidFill>
+              </a:rPr>
+              <a:t>Outcome variables</a:t>
+            </a:r>
+          </a:p>
+          <a:p>
+            <a:pPr algn="ctr"/>
+            <a:r>
+              <a:rPr lang="en-US" sz="1600" dirty="0">
+                <a:solidFill>
+                  <a:schemeClr val="accent4"/>
+                </a:solidFill>
+              </a:rPr>
+              <a:t>(hill0, hill1, hill2)</a:t>
+            </a:r>
+          </a:p>
+        </p:txBody>
+      </p:sp>
+      <p:pic>
+        <p:nvPicPr>
+          <p:cNvPr id="14" name="Graphic 13" descr="Table with solid fill">
+            <a:extLst>
+              <a:ext uri="{FF2B5EF4-FFF2-40B4-BE49-F238E27FC236}">
+                <a16:creationId xmlns:a16="http://schemas.microsoft.com/office/drawing/2014/main" id="{520D0D51-2D7F-C854-B243-EDBC4CDF38AA}"/>
+              </a:ext>
+            </a:extLst>
+          </p:cNvPr>
+          <p:cNvPicPr>
+            <a:picLocks noChangeAspect="1"/>
+          </p:cNvPicPr>
+          <p:nvPr/>
+        </p:nvPicPr>
+        <p:blipFill>
+          <a:blip r:embed="rId7">
+            <a:extLst>
+              <a:ext uri="{96DAC541-7B7A-43D3-8B79-37D633B846F1}">
+                <asvg:svgBlip xmlns:asvg="http://schemas.microsoft.com/office/drawing/2016/SVG/main" r:embed="rId8"/>
+              </a:ext>
+            </a:extLst>
+          </a:blip>
+          <a:stretch>
+            <a:fillRect/>
+          </a:stretch>
+        </p:blipFill>
+        <p:spPr>
+          <a:xfrm>
+            <a:off x="4109271" y="2970424"/>
+            <a:ext cx="914400" cy="914400"/>
+          </a:xfrm>
+          <a:prstGeom prst="rect">
+            <a:avLst/>
+          </a:prstGeom>
+        </p:spPr>
+      </p:pic>
+      <p:sp>
+        <p:nvSpPr>
+          <p:cNvPr id="15" name="TextBox 14">
+            <a:extLst>
+              <a:ext uri="{FF2B5EF4-FFF2-40B4-BE49-F238E27FC236}">
+                <a16:creationId xmlns:a16="http://schemas.microsoft.com/office/drawing/2014/main" id="{1C5DD975-80F7-D344-306D-0F80E0ED0768}"/>
+              </a:ext>
+            </a:extLst>
+          </p:cNvPr>
+          <p:cNvSpPr txBox="1"/>
+          <p:nvPr/>
+        </p:nvSpPr>
+        <p:spPr>
+          <a:xfrm>
+            <a:off x="3602888" y="2445872"/>
+            <a:ext cx="1938223" cy="615553"/>
+          </a:xfrm>
+          <a:prstGeom prst="rect">
+            <a:avLst/>
+          </a:prstGeom>
+          <a:noFill/>
+        </p:spPr>
+        <p:txBody>
+          <a:bodyPr wrap="none" rtlCol="0">
+            <a:spAutoFit/>
+          </a:bodyPr>
+          <a:lstStyle/>
+          <a:p>
+            <a:pPr algn="ctr"/>
+            <a:r>
+              <a:rPr lang="en-US" dirty="0">
+                <a:solidFill>
+                  <a:schemeClr val="accent4"/>
+                </a:solidFill>
+              </a:rPr>
+              <a:t>Outcome variables</a:t>
+            </a:r>
+          </a:p>
+          <a:p>
+            <a:pPr algn="ctr"/>
+            <a:r>
+              <a:rPr lang="en-US" sz="1600" dirty="0">
+                <a:solidFill>
+                  <a:schemeClr val="accent4"/>
+                </a:solidFill>
+              </a:rPr>
+              <a:t>(hill0, hill1, hill2)</a:t>
+            </a:r>
+          </a:p>
+        </p:txBody>
+      </p:sp>
+      <p:sp>
+        <p:nvSpPr>
+          <p:cNvPr id="16" name="TextBox 15">
+            <a:extLst>
+              <a:ext uri="{FF2B5EF4-FFF2-40B4-BE49-F238E27FC236}">
+                <a16:creationId xmlns:a16="http://schemas.microsoft.com/office/drawing/2014/main" id="{9107F7C1-AC6D-2494-6328-E9C8F93AA63C}"/>
+              </a:ext>
+            </a:extLst>
+          </p:cNvPr>
+          <p:cNvSpPr txBox="1"/>
+          <p:nvPr/>
+        </p:nvSpPr>
+        <p:spPr>
+          <a:xfrm>
+            <a:off x="5477248" y="1705523"/>
+            <a:ext cx="961610" cy="369332"/>
+          </a:xfrm>
+          <a:prstGeom prst="rect">
+            <a:avLst/>
+          </a:prstGeom>
+          <a:noFill/>
+        </p:spPr>
+        <p:txBody>
+          <a:bodyPr wrap="none" rtlCol="0">
+            <a:spAutoFit/>
+          </a:bodyPr>
+          <a:lstStyle/>
+          <a:p>
+            <a:r>
+              <a:rPr lang="en-US" dirty="0"/>
+              <a:t>produce</a:t>
+            </a:r>
+          </a:p>
+        </p:txBody>
+      </p:sp>
+      <p:pic>
+        <p:nvPicPr>
+          <p:cNvPr id="19" name="Graphic 18" descr="Table with solid fill">
+            <a:extLst>
+              <a:ext uri="{FF2B5EF4-FFF2-40B4-BE49-F238E27FC236}">
+                <a16:creationId xmlns:a16="http://schemas.microsoft.com/office/drawing/2014/main" id="{AAA082ED-18A5-2C6F-61CD-B0986AA5716E}"/>
+              </a:ext>
+            </a:extLst>
+          </p:cNvPr>
+          <p:cNvPicPr>
+            <a:picLocks noChangeAspect="1"/>
+          </p:cNvPicPr>
+          <p:nvPr/>
+        </p:nvPicPr>
+        <p:blipFill>
+          <a:blip r:embed="rId5">
+            <a:extLst>
+              <a:ext uri="{96DAC541-7B7A-43D3-8B79-37D633B846F1}">
+                <asvg:svgBlip xmlns:asvg="http://schemas.microsoft.com/office/drawing/2016/SVG/main" r:embed="rId6"/>
+              </a:ext>
+            </a:extLst>
+          </a:blip>
+          <a:stretch>
+            <a:fillRect/>
+          </a:stretch>
+        </p:blipFill>
+        <p:spPr>
+          <a:xfrm>
+            <a:off x="6800947" y="2970424"/>
+            <a:ext cx="914400" cy="914400"/>
+          </a:xfrm>
+          <a:prstGeom prst="rect">
+            <a:avLst/>
+          </a:prstGeom>
+        </p:spPr>
+      </p:pic>
+      <p:sp>
+        <p:nvSpPr>
+          <p:cNvPr id="20" name="TextBox 19">
+            <a:extLst>
+              <a:ext uri="{FF2B5EF4-FFF2-40B4-BE49-F238E27FC236}">
+                <a16:creationId xmlns:a16="http://schemas.microsoft.com/office/drawing/2014/main" id="{DADA7436-A6AF-3BA5-BFB5-5C443A373F8C}"/>
+              </a:ext>
+            </a:extLst>
+          </p:cNvPr>
+          <p:cNvSpPr txBox="1"/>
+          <p:nvPr/>
+        </p:nvSpPr>
+        <p:spPr>
+          <a:xfrm>
+            <a:off x="6352899" y="2459824"/>
+            <a:ext cx="1810496" cy="615553"/>
+          </a:xfrm>
+          <a:prstGeom prst="rect">
+            <a:avLst/>
+          </a:prstGeom>
+          <a:noFill/>
+        </p:spPr>
+        <p:txBody>
+          <a:bodyPr wrap="none" rtlCol="0">
+            <a:spAutoFit/>
+          </a:bodyPr>
+          <a:lstStyle/>
+          <a:p>
+            <a:pPr algn="ctr"/>
+            <a:r>
+              <a:rPr lang="en-US" dirty="0"/>
+              <a:t>Input parameters</a:t>
+            </a:r>
+            <a:br>
+              <a:rPr lang="en-US" dirty="0"/>
+            </a:br>
+            <a:r>
+              <a:rPr lang="en-US" sz="1600" dirty="0"/>
+              <a:t>(</a:t>
+            </a:r>
+            <a:r>
+              <a:rPr lang="en-US" sz="1600" i="1" dirty="0"/>
+              <a:t>m, v, J, </a:t>
+            </a:r>
+            <a:r>
+              <a:rPr lang="en-US" sz="1600" i="1" dirty="0" err="1"/>
+              <a:t>Jm</a:t>
+            </a:r>
+            <a:r>
+              <a:rPr lang="en-US" sz="1600" i="1" dirty="0"/>
+              <a:t>, </a:t>
+            </a:r>
+            <a:r>
+              <a:rPr lang="en-US" sz="1600" i="1" dirty="0" err="1"/>
+              <a:t>Sm</a:t>
+            </a:r>
+            <a:r>
+              <a:rPr lang="en-US" sz="1600" i="1" dirty="0"/>
+              <a:t>)</a:t>
+            </a:r>
+            <a:endParaRPr lang="en-US" dirty="0"/>
+          </a:p>
+        </p:txBody>
+      </p:sp>
+      <p:pic>
+        <p:nvPicPr>
+          <p:cNvPr id="21" name="Graphic 20" descr="Arrow Right with solid fill">
+            <a:extLst>
+              <a:ext uri="{FF2B5EF4-FFF2-40B4-BE49-F238E27FC236}">
+                <a16:creationId xmlns:a16="http://schemas.microsoft.com/office/drawing/2014/main" id="{F0DD0248-5EA6-57A2-21DE-EEA6A092FD10}"/>
+              </a:ext>
+            </a:extLst>
+          </p:cNvPr>
+          <p:cNvPicPr>
+            <a:picLocks noChangeAspect="1"/>
+          </p:cNvPicPr>
+          <p:nvPr/>
+        </p:nvPicPr>
+        <p:blipFill>
+          <a:blip r:embed="rId2">
+            <a:extLst>
+              <a:ext uri="{96DAC541-7B7A-43D3-8B79-37D633B846F1}">
+                <asvg:svgBlip xmlns:asvg="http://schemas.microsoft.com/office/drawing/2016/SVG/main" r:embed="rId3"/>
+              </a:ext>
+            </a:extLst>
+          </a:blip>
+          <a:stretch>
+            <a:fillRect/>
+          </a:stretch>
+        </p:blipFill>
+        <p:spPr>
+          <a:xfrm>
+            <a:off x="5592336" y="3021462"/>
+            <a:ext cx="731433" cy="731433"/>
+          </a:xfrm>
+          <a:prstGeom prst="rect">
+            <a:avLst/>
+          </a:prstGeom>
+        </p:spPr>
+      </p:pic>
+      <p:sp>
+        <p:nvSpPr>
+          <p:cNvPr id="22" name="TextBox 21">
+            <a:extLst>
+              <a:ext uri="{FF2B5EF4-FFF2-40B4-BE49-F238E27FC236}">
+                <a16:creationId xmlns:a16="http://schemas.microsoft.com/office/drawing/2014/main" id="{904BF611-101D-AB20-487E-95AE0EBE58F8}"/>
+              </a:ext>
+            </a:extLst>
+          </p:cNvPr>
+          <p:cNvSpPr txBox="1"/>
+          <p:nvPr/>
+        </p:nvSpPr>
+        <p:spPr>
+          <a:xfrm>
+            <a:off x="5495436" y="2937669"/>
+            <a:ext cx="848502" cy="369332"/>
+          </a:xfrm>
+          <a:prstGeom prst="rect">
+            <a:avLst/>
+          </a:prstGeom>
+          <a:noFill/>
+        </p:spPr>
+        <p:txBody>
+          <a:bodyPr wrap="none" rtlCol="0">
+            <a:spAutoFit/>
+          </a:bodyPr>
+          <a:lstStyle/>
+          <a:p>
+            <a:r>
+              <a:rPr lang="en-US" dirty="0"/>
+              <a:t>predict</a:t>
+            </a:r>
+          </a:p>
+        </p:txBody>
+      </p:sp>
+      <p:sp>
+        <p:nvSpPr>
+          <p:cNvPr id="23" name="TextBox 22">
+            <a:extLst>
+              <a:ext uri="{FF2B5EF4-FFF2-40B4-BE49-F238E27FC236}">
+                <a16:creationId xmlns:a16="http://schemas.microsoft.com/office/drawing/2014/main" id="{13F89BB4-CE7E-494F-A6E7-70EA62DAB4FD}"/>
+              </a:ext>
+            </a:extLst>
+          </p:cNvPr>
+          <p:cNvSpPr txBox="1"/>
+          <p:nvPr/>
+        </p:nvSpPr>
+        <p:spPr>
+          <a:xfrm>
+            <a:off x="413761" y="3921910"/>
+            <a:ext cx="2805030" cy="1200329"/>
+          </a:xfrm>
+          <a:prstGeom prst="rect">
+            <a:avLst/>
+          </a:prstGeom>
+          <a:noFill/>
+        </p:spPr>
+        <p:txBody>
+          <a:bodyPr wrap="square" rtlCol="0">
+            <a:spAutoFit/>
+          </a:bodyPr>
+          <a:lstStyle/>
+          <a:p>
+            <a:pPr algn="ctr"/>
+            <a:r>
+              <a:rPr lang="en-US" dirty="0"/>
+              <a:t>Use this model to estimate the </a:t>
+            </a:r>
+            <a:r>
+              <a:rPr lang="en-US" b="1" dirty="0"/>
+              <a:t>parameter values </a:t>
+            </a:r>
+            <a:r>
+              <a:rPr lang="en-US" dirty="0"/>
+              <a:t>that produced </a:t>
+            </a:r>
+            <a:r>
+              <a:rPr lang="en-US" b="1" dirty="0"/>
+              <a:t>observed outcomes</a:t>
+            </a:r>
+            <a:endParaRPr lang="en-US" dirty="0"/>
+          </a:p>
+        </p:txBody>
+      </p:sp>
+      <p:sp>
+        <p:nvSpPr>
+          <p:cNvPr id="24" name="TextBox 23">
+            <a:extLst>
+              <a:ext uri="{FF2B5EF4-FFF2-40B4-BE49-F238E27FC236}">
+                <a16:creationId xmlns:a16="http://schemas.microsoft.com/office/drawing/2014/main" id="{DA75B385-1346-D724-DF15-94D96195D217}"/>
+              </a:ext>
+            </a:extLst>
+          </p:cNvPr>
+          <p:cNvSpPr txBox="1"/>
+          <p:nvPr/>
+        </p:nvSpPr>
+        <p:spPr>
+          <a:xfrm>
+            <a:off x="3349742" y="4041133"/>
+            <a:ext cx="2444515" cy="615553"/>
+          </a:xfrm>
+          <a:prstGeom prst="rect">
+            <a:avLst/>
+          </a:prstGeom>
+          <a:noFill/>
+        </p:spPr>
+        <p:txBody>
+          <a:bodyPr wrap="none" rtlCol="0">
+            <a:spAutoFit/>
+          </a:bodyPr>
+          <a:lstStyle/>
+          <a:p>
+            <a:pPr algn="ctr"/>
+            <a:r>
+              <a:rPr lang="en-US" dirty="0">
+                <a:solidFill>
+                  <a:schemeClr val="accent4"/>
+                </a:solidFill>
+              </a:rPr>
+              <a:t>Focal outcome variables</a:t>
+            </a:r>
+          </a:p>
+          <a:p>
+            <a:pPr algn="ctr"/>
+            <a:r>
+              <a:rPr lang="en-US" sz="1600" dirty="0">
+                <a:solidFill>
+                  <a:schemeClr val="accent4"/>
+                </a:solidFill>
+              </a:rPr>
+              <a:t>(hill0 = …, hill1 = …, …)</a:t>
+            </a:r>
+          </a:p>
+        </p:txBody>
+      </p:sp>
+      <p:pic>
+        <p:nvPicPr>
+          <p:cNvPr id="25" name="Graphic 24" descr="Arrow Right with solid fill">
+            <a:extLst>
+              <a:ext uri="{FF2B5EF4-FFF2-40B4-BE49-F238E27FC236}">
+                <a16:creationId xmlns:a16="http://schemas.microsoft.com/office/drawing/2014/main" id="{2B484AE3-F98F-ADC4-C8A7-E9AD4A58E7D6}"/>
+              </a:ext>
+            </a:extLst>
+          </p:cNvPr>
+          <p:cNvPicPr>
+            <a:picLocks noChangeAspect="1"/>
+          </p:cNvPicPr>
+          <p:nvPr/>
+        </p:nvPicPr>
+        <p:blipFill>
+          <a:blip r:embed="rId2">
+            <a:extLst>
+              <a:ext uri="{96DAC541-7B7A-43D3-8B79-37D633B846F1}">
+                <asvg:svgBlip xmlns:asvg="http://schemas.microsoft.com/office/drawing/2016/SVG/main" r:embed="rId3"/>
+              </a:ext>
+            </a:extLst>
+          </a:blip>
+          <a:stretch>
+            <a:fillRect/>
+          </a:stretch>
+        </p:blipFill>
+        <p:spPr>
+          <a:xfrm>
+            <a:off x="5646310" y="4304823"/>
+            <a:ext cx="731433" cy="731433"/>
+          </a:xfrm>
+          <a:prstGeom prst="rect">
+            <a:avLst/>
+          </a:prstGeom>
+        </p:spPr>
+      </p:pic>
+      <p:sp>
+        <p:nvSpPr>
+          <p:cNvPr id="26" name="TextBox 25">
+            <a:extLst>
+              <a:ext uri="{FF2B5EF4-FFF2-40B4-BE49-F238E27FC236}">
+                <a16:creationId xmlns:a16="http://schemas.microsoft.com/office/drawing/2014/main" id="{8AE32EB3-48DA-F7DB-7086-24B5798DDF41}"/>
+              </a:ext>
+            </a:extLst>
+          </p:cNvPr>
+          <p:cNvSpPr txBox="1"/>
+          <p:nvPr/>
+        </p:nvSpPr>
+        <p:spPr>
+          <a:xfrm>
+            <a:off x="5541111" y="4273229"/>
+            <a:ext cx="999825" cy="369332"/>
+          </a:xfrm>
+          <a:prstGeom prst="rect">
+            <a:avLst/>
+          </a:prstGeom>
+          <a:noFill/>
+        </p:spPr>
+        <p:txBody>
+          <a:bodyPr wrap="none" rtlCol="0">
+            <a:spAutoFit/>
+          </a:bodyPr>
+          <a:lstStyle/>
+          <a:p>
+            <a:r>
+              <a:rPr lang="en-US" dirty="0"/>
+              <a:t>estimate</a:t>
+            </a:r>
+          </a:p>
+        </p:txBody>
+      </p:sp>
+      <p:sp>
+        <p:nvSpPr>
+          <p:cNvPr id="27" name="TextBox 26">
+            <a:extLst>
+              <a:ext uri="{FF2B5EF4-FFF2-40B4-BE49-F238E27FC236}">
+                <a16:creationId xmlns:a16="http://schemas.microsoft.com/office/drawing/2014/main" id="{955FB97F-384D-E1E2-2A4D-9873ABA5B705}"/>
+              </a:ext>
+            </a:extLst>
+          </p:cNvPr>
+          <p:cNvSpPr txBox="1"/>
+          <p:nvPr/>
+        </p:nvSpPr>
+        <p:spPr>
+          <a:xfrm>
+            <a:off x="6326994" y="4041132"/>
+            <a:ext cx="2353465" cy="615553"/>
+          </a:xfrm>
+          <a:prstGeom prst="rect">
+            <a:avLst/>
+          </a:prstGeom>
+          <a:noFill/>
+        </p:spPr>
+        <p:txBody>
+          <a:bodyPr wrap="none" rtlCol="0">
+            <a:spAutoFit/>
+          </a:bodyPr>
+          <a:lstStyle/>
+          <a:p>
+            <a:pPr algn="ctr"/>
+            <a:r>
+              <a:rPr lang="en-US" dirty="0"/>
+              <a:t>Generating parameters</a:t>
+            </a:r>
+          </a:p>
+          <a:p>
+            <a:pPr algn="ctr"/>
+            <a:r>
+              <a:rPr lang="en-US" sz="1600" i="1" dirty="0"/>
+              <a:t>(m = …, v = …, …)</a:t>
+            </a:r>
+          </a:p>
+        </p:txBody>
+      </p:sp>
+    </p:spTree>
+    <p:extLst>
+      <p:ext uri="{BB962C8B-B14F-4D97-AF65-F5344CB8AC3E}">
+        <p14:creationId xmlns:p14="http://schemas.microsoft.com/office/powerpoint/2010/main" val="2888604141"/>
+      </p:ext>
+    </p:extLst>
+  </p:cSld>
+  <p:clrMapOvr>
+    <a:masterClrMapping/>
+  </p:clrMapOvr>
+</p:sld>
+</file>
+
+<file path=ppt/slides/slide57.xml><?xml version="1.0" encoding="utf-8"?>
+<p:sld xmlns:a="http://schemas.openxmlformats.org/drawingml/2006/main" xmlns:r="http://schemas.openxmlformats.org/officeDocument/2006/relationships" xmlns:p="http://schemas.openxmlformats.org/presentationml/2006/main">
+  <p:cSld>
+    <p:spTree>
+      <p:nvGrpSpPr>
+        <p:cNvPr id="1" name=""/>
+        <p:cNvGrpSpPr/>
+        <p:nvPr/>
+      </p:nvGrpSpPr>
+      <p:grpSpPr>
+        <a:xfrm>
+          <a:off x="0" y="0"/>
+          <a:ext cx="0" cy="0"/>
+          <a:chOff x="0" y="0"/>
+          <a:chExt cx="0" cy="0"/>
+        </a:xfrm>
+      </p:grpSpPr>
+      <p:sp>
+        <p:nvSpPr>
+          <p:cNvPr id="2" name="Title 1">
+            <a:extLst>
+              <a:ext uri="{FF2B5EF4-FFF2-40B4-BE49-F238E27FC236}">
+                <a16:creationId xmlns:a16="http://schemas.microsoft.com/office/drawing/2014/main" id="{B27191FA-B67F-312D-05C3-4420B3AAE319}"/>
+              </a:ext>
+            </a:extLst>
+          </p:cNvPr>
+          <p:cNvSpPr>
+            <a:spLocks noGrp="1"/>
+          </p:cNvSpPr>
+          <p:nvPr>
+            <p:ph type="title"/>
+          </p:nvPr>
+        </p:nvSpPr>
+        <p:spPr/>
+        <p:txBody>
+          <a:bodyPr/>
+          <a:lstStyle/>
+          <a:p>
+            <a:r>
+              <a:rPr lang="en-US" dirty="0"/>
+              <a:t>An example: predicting </a:t>
+            </a:r>
+            <a:r>
+              <a:rPr lang="en-US" i="1" dirty="0"/>
+              <a:t>m </a:t>
+            </a:r>
+            <a:r>
+              <a:rPr lang="en-US" dirty="0"/>
+              <a:t>and </a:t>
+            </a:r>
+            <a:r>
+              <a:rPr lang="en-US" i="1" dirty="0"/>
+              <a:t>v </a:t>
+            </a:r>
+            <a:r>
+              <a:rPr lang="en-US" dirty="0"/>
+              <a:t>from UNTB</a:t>
+            </a:r>
+          </a:p>
+        </p:txBody>
+      </p:sp>
+    </p:spTree>
+    <p:extLst>
+      <p:ext uri="{BB962C8B-B14F-4D97-AF65-F5344CB8AC3E}">
+        <p14:creationId xmlns:p14="http://schemas.microsoft.com/office/powerpoint/2010/main" val="1535017145"/>
+      </p:ext>
+    </p:extLst>
+  </p:cSld>
+  <p:clrMapOvr>
+    <a:masterClrMapping/>
+  </p:clrMapOvr>
+</p:sld>
+</file>
+
+<file path=ppt/slides/slide58.xml><?xml version="1.0" encoding="utf-8"?>
+<p:sld xmlns:a="http://schemas.openxmlformats.org/drawingml/2006/main" xmlns:r="http://schemas.openxmlformats.org/officeDocument/2006/relationships" xmlns:p="http://schemas.openxmlformats.org/presentationml/2006/main">
+  <p:cSld>
+    <p:spTree>
+      <p:nvGrpSpPr>
+        <p:cNvPr id="1" name=""/>
+        <p:cNvGrpSpPr/>
+        <p:nvPr/>
+      </p:nvGrpSpPr>
+      <p:grpSpPr>
+        <a:xfrm>
+          <a:off x="0" y="0"/>
+          <a:ext cx="0" cy="0"/>
+          <a:chOff x="0" y="0"/>
+          <a:chExt cx="0" cy="0"/>
+        </a:xfrm>
+      </p:grpSpPr>
+      <p:sp>
+        <p:nvSpPr>
+          <p:cNvPr id="2" name="Title 1">
+            <a:extLst>
+              <a:ext uri="{FF2B5EF4-FFF2-40B4-BE49-F238E27FC236}">
+                <a16:creationId xmlns:a16="http://schemas.microsoft.com/office/drawing/2014/main" id="{B27191FA-B67F-312D-05C3-4420B3AAE319}"/>
+              </a:ext>
+            </a:extLst>
+          </p:cNvPr>
+          <p:cNvSpPr>
+            <a:spLocks noGrp="1"/>
+          </p:cNvSpPr>
+          <p:nvPr>
+            <p:ph type="title"/>
+          </p:nvPr>
+        </p:nvSpPr>
+        <p:spPr/>
+        <p:txBody>
+          <a:bodyPr/>
+          <a:lstStyle/>
+          <a:p>
+            <a:r>
+              <a:rPr lang="en-US" dirty="0"/>
+              <a:t>An example: predicting </a:t>
+            </a:r>
+            <a:r>
+              <a:rPr lang="en-US" i="1" dirty="0"/>
+              <a:t>m </a:t>
+            </a:r>
+            <a:r>
+              <a:rPr lang="en-US" dirty="0"/>
+              <a:t>and </a:t>
+            </a:r>
+            <a:r>
+              <a:rPr lang="en-US" i="1" dirty="0"/>
+              <a:t>v </a:t>
+            </a:r>
+            <a:r>
+              <a:rPr lang="en-US" dirty="0"/>
+              <a:t>from UNTB</a:t>
+            </a:r>
+          </a:p>
+        </p:txBody>
+      </p:sp>
+      <p:sp>
+        <p:nvSpPr>
+          <p:cNvPr id="3" name="TextBox 2">
+            <a:extLst>
+              <a:ext uri="{FF2B5EF4-FFF2-40B4-BE49-F238E27FC236}">
+                <a16:creationId xmlns:a16="http://schemas.microsoft.com/office/drawing/2014/main" id="{5A68FB74-FCF7-16B9-974F-12F2A5E405E7}"/>
+              </a:ext>
+            </a:extLst>
+          </p:cNvPr>
+          <p:cNvSpPr txBox="1"/>
+          <p:nvPr/>
+        </p:nvSpPr>
+        <p:spPr>
+          <a:xfrm>
+            <a:off x="651230" y="1205441"/>
+            <a:ext cx="2330095" cy="923330"/>
+          </a:xfrm>
+          <a:prstGeom prst="rect">
+            <a:avLst/>
+          </a:prstGeom>
+          <a:noFill/>
+        </p:spPr>
+        <p:txBody>
+          <a:bodyPr wrap="square" rtlCol="0">
+            <a:spAutoFit/>
+          </a:bodyPr>
+          <a:lstStyle/>
+          <a:p>
+            <a:pPr algn="ctr"/>
+            <a:r>
+              <a:rPr lang="en-US" dirty="0"/>
+              <a:t>Run simulations over a wide range of parameter settings.</a:t>
+            </a:r>
+          </a:p>
+        </p:txBody>
+      </p:sp>
+      <p:sp>
+        <p:nvSpPr>
+          <p:cNvPr id="4" name="TextBox 3">
+            <a:extLst>
+              <a:ext uri="{FF2B5EF4-FFF2-40B4-BE49-F238E27FC236}">
+                <a16:creationId xmlns:a16="http://schemas.microsoft.com/office/drawing/2014/main" id="{6EFE8865-A820-344B-AACF-BD8C50489409}"/>
+              </a:ext>
+            </a:extLst>
+          </p:cNvPr>
+          <p:cNvSpPr txBox="1"/>
+          <p:nvPr/>
+        </p:nvSpPr>
+        <p:spPr>
+          <a:xfrm>
+            <a:off x="4997629" y="1205441"/>
+            <a:ext cx="2330095" cy="646331"/>
+          </a:xfrm>
+          <a:prstGeom prst="rect">
+            <a:avLst/>
+          </a:prstGeom>
+          <a:noFill/>
+        </p:spPr>
+        <p:txBody>
+          <a:bodyPr wrap="square" rtlCol="0">
+            <a:spAutoFit/>
+          </a:bodyPr>
+          <a:lstStyle/>
+          <a:p>
+            <a:pPr algn="ctr"/>
+            <a:r>
+              <a:rPr lang="en-US" dirty="0"/>
+              <a:t>Visual of parameter space to be explored</a:t>
+            </a:r>
+          </a:p>
+        </p:txBody>
+      </p:sp>
+    </p:spTree>
+    <p:extLst>
+      <p:ext uri="{BB962C8B-B14F-4D97-AF65-F5344CB8AC3E}">
+        <p14:creationId xmlns:p14="http://schemas.microsoft.com/office/powerpoint/2010/main" val="1675100650"/>
+      </p:ext>
+    </p:extLst>
+  </p:cSld>
+  <p:clrMapOvr>
+    <a:masterClrMapping/>
+  </p:clrMapOvr>
+</p:sld>
+</file>
+
+<file path=ppt/slides/slide59.xml><?xml version="1.0" encoding="utf-8"?>
+<p:sld xmlns:a="http://schemas.openxmlformats.org/drawingml/2006/main" xmlns:r="http://schemas.openxmlformats.org/officeDocument/2006/relationships" xmlns:p="http://schemas.openxmlformats.org/presentationml/2006/main">
+  <p:cSld>
+    <p:spTree>
+      <p:nvGrpSpPr>
+        <p:cNvPr id="1" name=""/>
+        <p:cNvGrpSpPr/>
+        <p:nvPr/>
+      </p:nvGrpSpPr>
+      <p:grpSpPr>
+        <a:xfrm>
+          <a:off x="0" y="0"/>
+          <a:ext cx="0" cy="0"/>
+          <a:chOff x="0" y="0"/>
+          <a:chExt cx="0" cy="0"/>
+        </a:xfrm>
+      </p:grpSpPr>
+      <p:sp>
+        <p:nvSpPr>
+          <p:cNvPr id="2" name="Title 1">
+            <a:extLst>
+              <a:ext uri="{FF2B5EF4-FFF2-40B4-BE49-F238E27FC236}">
+                <a16:creationId xmlns:a16="http://schemas.microsoft.com/office/drawing/2014/main" id="{B27191FA-B67F-312D-05C3-4420B3AAE319}"/>
+              </a:ext>
+            </a:extLst>
+          </p:cNvPr>
+          <p:cNvSpPr>
+            <a:spLocks noGrp="1"/>
+          </p:cNvSpPr>
+          <p:nvPr>
+            <p:ph type="title"/>
+          </p:nvPr>
+        </p:nvSpPr>
+        <p:spPr/>
+        <p:txBody>
+          <a:bodyPr/>
+          <a:lstStyle/>
+          <a:p>
+            <a:r>
+              <a:rPr lang="en-US" dirty="0"/>
+              <a:t>An example: predicting </a:t>
+            </a:r>
+            <a:r>
+              <a:rPr lang="en-US" i="1" dirty="0"/>
+              <a:t>m </a:t>
+            </a:r>
+            <a:r>
+              <a:rPr lang="en-US" dirty="0"/>
+              <a:t>and </a:t>
+            </a:r>
+            <a:r>
+              <a:rPr lang="en-US" i="1" dirty="0"/>
+              <a:t>v </a:t>
+            </a:r>
+            <a:r>
+              <a:rPr lang="en-US" dirty="0"/>
+              <a:t>from UNTB</a:t>
+            </a:r>
+          </a:p>
+        </p:txBody>
+      </p:sp>
+      <p:sp>
+        <p:nvSpPr>
+          <p:cNvPr id="3" name="TextBox 2">
+            <a:extLst>
+              <a:ext uri="{FF2B5EF4-FFF2-40B4-BE49-F238E27FC236}">
+                <a16:creationId xmlns:a16="http://schemas.microsoft.com/office/drawing/2014/main" id="{5A68FB74-FCF7-16B9-974F-12F2A5E405E7}"/>
+              </a:ext>
+            </a:extLst>
+          </p:cNvPr>
+          <p:cNvSpPr txBox="1"/>
+          <p:nvPr/>
+        </p:nvSpPr>
+        <p:spPr>
+          <a:xfrm>
+            <a:off x="651230" y="1205441"/>
+            <a:ext cx="2330095" cy="923330"/>
+          </a:xfrm>
+          <a:prstGeom prst="rect">
+            <a:avLst/>
+          </a:prstGeom>
+          <a:noFill/>
+        </p:spPr>
+        <p:txBody>
+          <a:bodyPr wrap="square" rtlCol="0">
+            <a:spAutoFit/>
+          </a:bodyPr>
+          <a:lstStyle/>
+          <a:p>
+            <a:pPr algn="ctr"/>
+            <a:r>
+              <a:rPr lang="en-US" dirty="0"/>
+              <a:t>Run simulations over a wide range of parameter settings.</a:t>
+            </a:r>
+          </a:p>
+        </p:txBody>
+      </p:sp>
+      <p:sp>
+        <p:nvSpPr>
+          <p:cNvPr id="4" name="TextBox 3">
+            <a:extLst>
+              <a:ext uri="{FF2B5EF4-FFF2-40B4-BE49-F238E27FC236}">
+                <a16:creationId xmlns:a16="http://schemas.microsoft.com/office/drawing/2014/main" id="{6EFE8865-A820-344B-AACF-BD8C50489409}"/>
+              </a:ext>
+            </a:extLst>
+          </p:cNvPr>
+          <p:cNvSpPr txBox="1"/>
+          <p:nvPr/>
+        </p:nvSpPr>
+        <p:spPr>
+          <a:xfrm>
+            <a:off x="4997629" y="1205441"/>
+            <a:ext cx="2330095" cy="646331"/>
+          </a:xfrm>
+          <a:prstGeom prst="rect">
+            <a:avLst/>
+          </a:prstGeom>
+          <a:noFill/>
+        </p:spPr>
+        <p:txBody>
+          <a:bodyPr wrap="square" rtlCol="0">
+            <a:spAutoFit/>
+          </a:bodyPr>
+          <a:lstStyle/>
+          <a:p>
+            <a:pPr algn="ctr"/>
+            <a:r>
+              <a:rPr lang="en-US" dirty="0"/>
+              <a:t>Visual of </a:t>
+            </a:r>
+            <a:r>
+              <a:rPr lang="en-US" dirty="0" err="1"/>
+              <a:t>dataframe</a:t>
+            </a:r>
+            <a:r>
+              <a:rPr lang="en-US" dirty="0"/>
+              <a:t> of params and results</a:t>
+            </a:r>
+          </a:p>
+        </p:txBody>
+      </p:sp>
+    </p:spTree>
+    <p:extLst>
+      <p:ext uri="{BB962C8B-B14F-4D97-AF65-F5344CB8AC3E}">
+        <p14:creationId xmlns:p14="http://schemas.microsoft.com/office/powerpoint/2010/main" val="920810382"/>
+      </p:ext>
+    </p:extLst>
   </p:cSld>
   <p:clrMapOvr>
     <a:masterClrMapping/>
@@ -40406,6 +42848,1346 @@
     <p:extLst>
       <p:ext uri="{BB962C8B-B14F-4D97-AF65-F5344CB8AC3E}">
         <p14:creationId xmlns:p14="http://schemas.microsoft.com/office/powerpoint/2010/main" val="696908748"/>
+      </p:ext>
+    </p:extLst>
+  </p:cSld>
+  <p:clrMapOvr>
+    <a:masterClrMapping/>
+  </p:clrMapOvr>
+</p:sld>
+</file>
+
+<file path=ppt/slides/slide60.xml><?xml version="1.0" encoding="utf-8"?>
+<p:sld xmlns:a="http://schemas.openxmlformats.org/drawingml/2006/main" xmlns:r="http://schemas.openxmlformats.org/officeDocument/2006/relationships" xmlns:p="http://schemas.openxmlformats.org/presentationml/2006/main">
+  <p:cSld>
+    <p:spTree>
+      <p:nvGrpSpPr>
+        <p:cNvPr id="1" name=""/>
+        <p:cNvGrpSpPr/>
+        <p:nvPr/>
+      </p:nvGrpSpPr>
+      <p:grpSpPr>
+        <a:xfrm>
+          <a:off x="0" y="0"/>
+          <a:ext cx="0" cy="0"/>
+          <a:chOff x="0" y="0"/>
+          <a:chExt cx="0" cy="0"/>
+        </a:xfrm>
+      </p:grpSpPr>
+      <p:sp>
+        <p:nvSpPr>
+          <p:cNvPr id="2" name="Title 1">
+            <a:extLst>
+              <a:ext uri="{FF2B5EF4-FFF2-40B4-BE49-F238E27FC236}">
+                <a16:creationId xmlns:a16="http://schemas.microsoft.com/office/drawing/2014/main" id="{B27191FA-B67F-312D-05C3-4420B3AAE319}"/>
+              </a:ext>
+            </a:extLst>
+          </p:cNvPr>
+          <p:cNvSpPr>
+            <a:spLocks noGrp="1"/>
+          </p:cNvSpPr>
+          <p:nvPr>
+            <p:ph type="title"/>
+          </p:nvPr>
+        </p:nvSpPr>
+        <p:spPr/>
+        <p:txBody>
+          <a:bodyPr/>
+          <a:lstStyle/>
+          <a:p>
+            <a:r>
+              <a:rPr lang="en-US" dirty="0"/>
+              <a:t>An example: predicting </a:t>
+            </a:r>
+            <a:r>
+              <a:rPr lang="en-US" i="1" dirty="0"/>
+              <a:t>m </a:t>
+            </a:r>
+            <a:r>
+              <a:rPr lang="en-US" dirty="0"/>
+              <a:t>and </a:t>
+            </a:r>
+            <a:r>
+              <a:rPr lang="en-US" i="1" dirty="0"/>
+              <a:t>v </a:t>
+            </a:r>
+            <a:r>
+              <a:rPr lang="en-US" dirty="0"/>
+              <a:t>from UNTB</a:t>
+            </a:r>
+          </a:p>
+        </p:txBody>
+      </p:sp>
+      <mc:AlternateContent xmlns:mc="http://schemas.openxmlformats.org/markup-compatibility/2006">
+        <mc:Choice xmlns:a14="http://schemas.microsoft.com/office/drawing/2010/main" Requires="a14">
+          <p:sp>
+            <p:nvSpPr>
+              <p:cNvPr id="3" name="TextBox 2">
+                <a:extLst>
+                  <a:ext uri="{FF2B5EF4-FFF2-40B4-BE49-F238E27FC236}">
+                    <a16:creationId xmlns:a16="http://schemas.microsoft.com/office/drawing/2014/main" id="{5A68FB74-FCF7-16B9-974F-12F2A5E405E7}"/>
+                  </a:ext>
+                </a:extLst>
+              </p:cNvPr>
+              <p:cNvSpPr txBox="1"/>
+              <p:nvPr/>
+            </p:nvSpPr>
+            <p:spPr>
+              <a:xfrm>
+                <a:off x="651230" y="1205441"/>
+                <a:ext cx="2330095" cy="646331"/>
+              </a:xfrm>
+              <a:prstGeom prst="rect">
+                <a:avLst/>
+              </a:prstGeom>
+              <a:noFill/>
+            </p:spPr>
+            <p:txBody>
+              <a:bodyPr wrap="square" rtlCol="0">
+                <a:spAutoFit/>
+              </a:bodyPr>
+              <a:lstStyle/>
+              <a:p>
+                <a:pPr algn="ctr"/>
+                <a:r>
+                  <a:rPr lang="en-US" dirty="0"/>
+                  <a:t>Fit a model of the form</a:t>
+                </a:r>
+              </a:p>
+              <a:p>
+                <a:pPr algn="ctr"/>
+                <a14:m>
+                  <m:oMathPara xmlns:m="http://schemas.openxmlformats.org/officeDocument/2006/math">
+                    <m:oMathParaPr>
+                      <m:jc m:val="centerGroup"/>
+                    </m:oMathParaPr>
+                    <m:oMath xmlns:m="http://schemas.openxmlformats.org/officeDocument/2006/math">
+                      <m:r>
+                        <a:rPr lang="en-US" b="0" i="1" smtClean="0">
+                          <a:latin typeface="Cambria Math" panose="02040503050406030204" pitchFamily="18" charset="0"/>
+                        </a:rPr>
+                        <m:t>𝑝𝑎𝑟𝑎𝑚𝑒𝑡𝑒𝑟𝑠</m:t>
+                      </m:r>
+                      <m:r>
+                        <a:rPr lang="en-US" b="0" i="1" smtClean="0">
+                          <a:latin typeface="Cambria Math" panose="02040503050406030204" pitchFamily="18" charset="0"/>
+                        </a:rPr>
+                        <m:t> ~ </m:t>
+                      </m:r>
+                      <m:r>
+                        <a:rPr lang="en-US" b="0" i="1" smtClean="0">
+                          <a:latin typeface="Cambria Math" panose="02040503050406030204" pitchFamily="18" charset="0"/>
+                        </a:rPr>
+                        <m:t>𝑟𝑒𝑠𝑢𝑙𝑡𝑠</m:t>
+                      </m:r>
+                    </m:oMath>
+                  </m:oMathPara>
+                </a14:m>
+                <a:endParaRPr lang="en-US" dirty="0"/>
+              </a:p>
+            </p:txBody>
+          </p:sp>
+        </mc:Choice>
+        <mc:Fallback>
+          <p:sp>
+            <p:nvSpPr>
+              <p:cNvPr id="3" name="TextBox 2">
+                <a:extLst>
+                  <a:ext uri="{FF2B5EF4-FFF2-40B4-BE49-F238E27FC236}">
+                    <a16:creationId xmlns:a16="http://schemas.microsoft.com/office/drawing/2014/main" id="{5A68FB74-FCF7-16B9-974F-12F2A5E405E7}"/>
+                  </a:ext>
+                </a:extLst>
+              </p:cNvPr>
+              <p:cNvSpPr txBox="1">
+                <a:spLocks noRot="1" noChangeAspect="1" noMove="1" noResize="1" noEditPoints="1" noAdjustHandles="1" noChangeArrowheads="1" noChangeShapeType="1" noTextEdit="1"/>
+              </p:cNvSpPr>
+              <p:nvPr/>
+            </p:nvSpPr>
+            <p:spPr>
+              <a:xfrm>
+                <a:off x="651230" y="1205441"/>
+                <a:ext cx="2330095" cy="646331"/>
+              </a:xfrm>
+              <a:prstGeom prst="rect">
+                <a:avLst/>
+              </a:prstGeom>
+              <a:blipFill>
+                <a:blip r:embed="rId2"/>
+                <a:stretch>
+                  <a:fillRect l="-2174" t="-5882" r="-2717" b="-9804"/>
+                </a:stretch>
+              </a:blipFill>
+            </p:spPr>
+            <p:txBody>
+              <a:bodyPr/>
+              <a:lstStyle/>
+              <a:p>
+                <a:r>
+                  <a:rPr lang="en-US">
+                    <a:noFill/>
+                  </a:rPr>
+                  <a:t> </a:t>
+                </a:r>
+              </a:p>
+            </p:txBody>
+          </p:sp>
+        </mc:Fallback>
+      </mc:AlternateContent>
+      <p:sp>
+        <p:nvSpPr>
+          <p:cNvPr id="4" name="TextBox 3">
+            <a:extLst>
+              <a:ext uri="{FF2B5EF4-FFF2-40B4-BE49-F238E27FC236}">
+                <a16:creationId xmlns:a16="http://schemas.microsoft.com/office/drawing/2014/main" id="{1806FEA3-F95B-B0B2-6130-56948EE0BB29}"/>
+              </a:ext>
+            </a:extLst>
+          </p:cNvPr>
+          <p:cNvSpPr txBox="1"/>
+          <p:nvPr/>
+        </p:nvSpPr>
+        <p:spPr>
+          <a:xfrm>
+            <a:off x="4696691" y="1667106"/>
+            <a:ext cx="3692101" cy="369332"/>
+          </a:xfrm>
+          <a:prstGeom prst="rect">
+            <a:avLst/>
+          </a:prstGeom>
+          <a:noFill/>
+        </p:spPr>
+        <p:txBody>
+          <a:bodyPr wrap="none" rtlCol="0">
+            <a:spAutoFit/>
+          </a:bodyPr>
+          <a:lstStyle/>
+          <a:p>
+            <a:r>
+              <a:rPr lang="en-US" dirty="0"/>
+              <a:t>(multiplot of hill0,1,2 vs m from sims)</a:t>
+            </a:r>
+          </a:p>
+        </p:txBody>
+      </p:sp>
+    </p:spTree>
+    <p:extLst>
+      <p:ext uri="{BB962C8B-B14F-4D97-AF65-F5344CB8AC3E}">
+        <p14:creationId xmlns:p14="http://schemas.microsoft.com/office/powerpoint/2010/main" val="1792231045"/>
+      </p:ext>
+    </p:extLst>
+  </p:cSld>
+  <p:clrMapOvr>
+    <a:masterClrMapping/>
+  </p:clrMapOvr>
+</p:sld>
+</file>
+
+<file path=ppt/slides/slide61.xml><?xml version="1.0" encoding="utf-8"?>
+<p:sld xmlns:a="http://schemas.openxmlformats.org/drawingml/2006/main" xmlns:r="http://schemas.openxmlformats.org/officeDocument/2006/relationships" xmlns:p="http://schemas.openxmlformats.org/presentationml/2006/main">
+  <p:cSld>
+    <p:spTree>
+      <p:nvGrpSpPr>
+        <p:cNvPr id="1" name=""/>
+        <p:cNvGrpSpPr/>
+        <p:nvPr/>
+      </p:nvGrpSpPr>
+      <p:grpSpPr>
+        <a:xfrm>
+          <a:off x="0" y="0"/>
+          <a:ext cx="0" cy="0"/>
+          <a:chOff x="0" y="0"/>
+          <a:chExt cx="0" cy="0"/>
+        </a:xfrm>
+      </p:grpSpPr>
+      <p:sp>
+        <p:nvSpPr>
+          <p:cNvPr id="2" name="Title 1">
+            <a:extLst>
+              <a:ext uri="{FF2B5EF4-FFF2-40B4-BE49-F238E27FC236}">
+                <a16:creationId xmlns:a16="http://schemas.microsoft.com/office/drawing/2014/main" id="{B27191FA-B67F-312D-05C3-4420B3AAE319}"/>
+              </a:ext>
+            </a:extLst>
+          </p:cNvPr>
+          <p:cNvSpPr>
+            <a:spLocks noGrp="1"/>
+          </p:cNvSpPr>
+          <p:nvPr>
+            <p:ph type="title"/>
+          </p:nvPr>
+        </p:nvSpPr>
+        <p:spPr/>
+        <p:txBody>
+          <a:bodyPr/>
+          <a:lstStyle/>
+          <a:p>
+            <a:r>
+              <a:rPr lang="en-US" dirty="0"/>
+              <a:t>An example: predicting </a:t>
+            </a:r>
+            <a:r>
+              <a:rPr lang="en-US" i="1" dirty="0"/>
+              <a:t>m </a:t>
+            </a:r>
+            <a:r>
+              <a:rPr lang="en-US" dirty="0"/>
+              <a:t>and </a:t>
+            </a:r>
+            <a:r>
+              <a:rPr lang="en-US" i="1" dirty="0"/>
+              <a:t>v </a:t>
+            </a:r>
+            <a:r>
+              <a:rPr lang="en-US" dirty="0"/>
+              <a:t>from UNTB</a:t>
+            </a:r>
+          </a:p>
+        </p:txBody>
+      </p:sp>
+      <mc:AlternateContent xmlns:mc="http://schemas.openxmlformats.org/markup-compatibility/2006">
+        <mc:Choice xmlns:a14="http://schemas.microsoft.com/office/drawing/2010/main" Requires="a14">
+          <p:sp>
+            <p:nvSpPr>
+              <p:cNvPr id="3" name="TextBox 2">
+                <a:extLst>
+                  <a:ext uri="{FF2B5EF4-FFF2-40B4-BE49-F238E27FC236}">
+                    <a16:creationId xmlns:a16="http://schemas.microsoft.com/office/drawing/2014/main" id="{5A68FB74-FCF7-16B9-974F-12F2A5E405E7}"/>
+                  </a:ext>
+                </a:extLst>
+              </p:cNvPr>
+              <p:cNvSpPr txBox="1"/>
+              <p:nvPr/>
+            </p:nvSpPr>
+            <p:spPr>
+              <a:xfrm>
+                <a:off x="651230" y="1205441"/>
+                <a:ext cx="2330095" cy="646331"/>
+              </a:xfrm>
+              <a:prstGeom prst="rect">
+                <a:avLst/>
+              </a:prstGeom>
+              <a:noFill/>
+            </p:spPr>
+            <p:txBody>
+              <a:bodyPr wrap="square" rtlCol="0">
+                <a:spAutoFit/>
+              </a:bodyPr>
+              <a:lstStyle/>
+              <a:p>
+                <a:pPr algn="ctr"/>
+                <a:r>
+                  <a:rPr lang="en-US" dirty="0"/>
+                  <a:t>Fit a model of the form</a:t>
+                </a:r>
+              </a:p>
+              <a:p>
+                <a:pPr algn="ctr"/>
+                <a14:m>
+                  <m:oMathPara xmlns:m="http://schemas.openxmlformats.org/officeDocument/2006/math">
+                    <m:oMathParaPr>
+                      <m:jc m:val="centerGroup"/>
+                    </m:oMathParaPr>
+                    <m:oMath xmlns:m="http://schemas.openxmlformats.org/officeDocument/2006/math">
+                      <m:r>
+                        <a:rPr lang="en-US" b="0" i="1" smtClean="0">
+                          <a:latin typeface="Cambria Math" panose="02040503050406030204" pitchFamily="18" charset="0"/>
+                        </a:rPr>
+                        <m:t>𝑝𝑎𝑟𝑎𝑚𝑒𝑡𝑒𝑟𝑠</m:t>
+                      </m:r>
+                      <m:r>
+                        <a:rPr lang="en-US" b="0" i="1" smtClean="0">
+                          <a:latin typeface="Cambria Math" panose="02040503050406030204" pitchFamily="18" charset="0"/>
+                        </a:rPr>
+                        <m:t> ~ </m:t>
+                      </m:r>
+                      <m:r>
+                        <a:rPr lang="en-US" b="0" i="1" smtClean="0">
+                          <a:latin typeface="Cambria Math" panose="02040503050406030204" pitchFamily="18" charset="0"/>
+                        </a:rPr>
+                        <m:t>𝑟𝑒𝑠𝑢𝑙𝑡𝑠</m:t>
+                      </m:r>
+                    </m:oMath>
+                  </m:oMathPara>
+                </a14:m>
+                <a:endParaRPr lang="en-US" dirty="0"/>
+              </a:p>
+            </p:txBody>
+          </p:sp>
+        </mc:Choice>
+        <mc:Fallback>
+          <p:sp>
+            <p:nvSpPr>
+              <p:cNvPr id="3" name="TextBox 2">
+                <a:extLst>
+                  <a:ext uri="{FF2B5EF4-FFF2-40B4-BE49-F238E27FC236}">
+                    <a16:creationId xmlns:a16="http://schemas.microsoft.com/office/drawing/2014/main" id="{5A68FB74-FCF7-16B9-974F-12F2A5E405E7}"/>
+                  </a:ext>
+                </a:extLst>
+              </p:cNvPr>
+              <p:cNvSpPr txBox="1">
+                <a:spLocks noRot="1" noChangeAspect="1" noMove="1" noResize="1" noEditPoints="1" noAdjustHandles="1" noChangeArrowheads="1" noChangeShapeType="1" noTextEdit="1"/>
+              </p:cNvSpPr>
+              <p:nvPr/>
+            </p:nvSpPr>
+            <p:spPr>
+              <a:xfrm>
+                <a:off x="651230" y="1205441"/>
+                <a:ext cx="2330095" cy="646331"/>
+              </a:xfrm>
+              <a:prstGeom prst="rect">
+                <a:avLst/>
+              </a:prstGeom>
+              <a:blipFill>
+                <a:blip r:embed="rId2"/>
+                <a:stretch>
+                  <a:fillRect l="-2174" t="-5882" r="-2717" b="-9804"/>
+                </a:stretch>
+              </a:blipFill>
+            </p:spPr>
+            <p:txBody>
+              <a:bodyPr/>
+              <a:lstStyle/>
+              <a:p>
+                <a:r>
+                  <a:rPr lang="en-US">
+                    <a:noFill/>
+                  </a:rPr>
+                  <a:t> </a:t>
+                </a:r>
+              </a:p>
+            </p:txBody>
+          </p:sp>
+        </mc:Fallback>
+      </mc:AlternateContent>
+      <p:sp>
+        <p:nvSpPr>
+          <p:cNvPr id="5" name="TextBox 4">
+            <a:extLst>
+              <a:ext uri="{FF2B5EF4-FFF2-40B4-BE49-F238E27FC236}">
+                <a16:creationId xmlns:a16="http://schemas.microsoft.com/office/drawing/2014/main" id="{B6A319C0-F1ED-58EC-2E7C-57F870987B9E}"/>
+              </a:ext>
+            </a:extLst>
+          </p:cNvPr>
+          <p:cNvSpPr txBox="1"/>
+          <p:nvPr/>
+        </p:nvSpPr>
+        <p:spPr>
+          <a:xfrm>
+            <a:off x="4800669" y="1791158"/>
+            <a:ext cx="3983113" cy="1477328"/>
+          </a:xfrm>
+          <a:prstGeom prst="rect">
+            <a:avLst/>
+          </a:prstGeom>
+          <a:noFill/>
+        </p:spPr>
+        <p:txBody>
+          <a:bodyPr wrap="square" rtlCol="0">
+            <a:spAutoFit/>
+          </a:bodyPr>
+          <a:lstStyle/>
+          <a:p>
+            <a:r>
+              <a:rPr lang="en-US" dirty="0"/>
+              <a:t>show code predicting using random forest</a:t>
+            </a:r>
+          </a:p>
+          <a:p>
+            <a:endParaRPr lang="en-US" dirty="0"/>
+          </a:p>
+          <a:p>
+            <a:r>
+              <a:rPr lang="en-US" dirty="0"/>
+              <a:t>plan to comment on but not deeply explain RF</a:t>
+            </a:r>
+          </a:p>
+        </p:txBody>
+      </p:sp>
+    </p:spTree>
+    <p:extLst>
+      <p:ext uri="{BB962C8B-B14F-4D97-AF65-F5344CB8AC3E}">
+        <p14:creationId xmlns:p14="http://schemas.microsoft.com/office/powerpoint/2010/main" val="2154635366"/>
+      </p:ext>
+    </p:extLst>
+  </p:cSld>
+  <p:clrMapOvr>
+    <a:masterClrMapping/>
+  </p:clrMapOvr>
+</p:sld>
+</file>
+
+<file path=ppt/slides/slide62.xml><?xml version="1.0" encoding="utf-8"?>
+<p:sld xmlns:a="http://schemas.openxmlformats.org/drawingml/2006/main" xmlns:r="http://schemas.openxmlformats.org/officeDocument/2006/relationships" xmlns:p="http://schemas.openxmlformats.org/presentationml/2006/main">
+  <p:cSld>
+    <p:spTree>
+      <p:nvGrpSpPr>
+        <p:cNvPr id="1" name=""/>
+        <p:cNvGrpSpPr/>
+        <p:nvPr/>
+      </p:nvGrpSpPr>
+      <p:grpSpPr>
+        <a:xfrm>
+          <a:off x="0" y="0"/>
+          <a:ext cx="0" cy="0"/>
+          <a:chOff x="0" y="0"/>
+          <a:chExt cx="0" cy="0"/>
+        </a:xfrm>
+      </p:grpSpPr>
+      <p:sp>
+        <p:nvSpPr>
+          <p:cNvPr id="2" name="Title 1">
+            <a:extLst>
+              <a:ext uri="{FF2B5EF4-FFF2-40B4-BE49-F238E27FC236}">
+                <a16:creationId xmlns:a16="http://schemas.microsoft.com/office/drawing/2014/main" id="{B27191FA-B67F-312D-05C3-4420B3AAE319}"/>
+              </a:ext>
+            </a:extLst>
+          </p:cNvPr>
+          <p:cNvSpPr>
+            <a:spLocks noGrp="1"/>
+          </p:cNvSpPr>
+          <p:nvPr>
+            <p:ph type="title"/>
+          </p:nvPr>
+        </p:nvSpPr>
+        <p:spPr/>
+        <p:txBody>
+          <a:bodyPr/>
+          <a:lstStyle/>
+          <a:p>
+            <a:r>
+              <a:rPr lang="en-US" dirty="0"/>
+              <a:t>An example: predicting </a:t>
+            </a:r>
+            <a:r>
+              <a:rPr lang="en-US" i="1" dirty="0"/>
+              <a:t>m </a:t>
+            </a:r>
+            <a:r>
+              <a:rPr lang="en-US" dirty="0"/>
+              <a:t>and </a:t>
+            </a:r>
+            <a:r>
+              <a:rPr lang="en-US" i="1" dirty="0"/>
+              <a:t>v </a:t>
+            </a:r>
+            <a:r>
+              <a:rPr lang="en-US" dirty="0"/>
+              <a:t>from UNTB</a:t>
+            </a:r>
+          </a:p>
+        </p:txBody>
+      </p:sp>
+      <p:sp>
+        <p:nvSpPr>
+          <p:cNvPr id="3" name="TextBox 2">
+            <a:extLst>
+              <a:ext uri="{FF2B5EF4-FFF2-40B4-BE49-F238E27FC236}">
+                <a16:creationId xmlns:a16="http://schemas.microsoft.com/office/drawing/2014/main" id="{5A68FB74-FCF7-16B9-974F-12F2A5E405E7}"/>
+              </a:ext>
+            </a:extLst>
+          </p:cNvPr>
+          <p:cNvSpPr txBox="1"/>
+          <p:nvPr/>
+        </p:nvSpPr>
+        <p:spPr>
+          <a:xfrm>
+            <a:off x="651230" y="1205441"/>
+            <a:ext cx="2330095" cy="1477328"/>
+          </a:xfrm>
+          <a:prstGeom prst="rect">
+            <a:avLst/>
+          </a:prstGeom>
+          <a:noFill/>
+        </p:spPr>
+        <p:txBody>
+          <a:bodyPr wrap="square" rtlCol="0">
+            <a:spAutoFit/>
+          </a:bodyPr>
+          <a:lstStyle/>
+          <a:p>
+            <a:pPr algn="ctr"/>
+            <a:r>
+              <a:rPr lang="en-US" dirty="0"/>
+              <a:t>Use this model to estimate the </a:t>
+            </a:r>
+            <a:r>
+              <a:rPr lang="en-US" b="1" dirty="0"/>
+              <a:t>parameter values </a:t>
+            </a:r>
+            <a:r>
+              <a:rPr lang="en-US" dirty="0"/>
+              <a:t>that produced </a:t>
+            </a:r>
+            <a:r>
+              <a:rPr lang="en-US" b="1" dirty="0"/>
+              <a:t>observed outcomes</a:t>
+            </a:r>
+            <a:endParaRPr lang="en-US" dirty="0"/>
+          </a:p>
+        </p:txBody>
+      </p:sp>
+      <p:sp>
+        <p:nvSpPr>
+          <p:cNvPr id="5" name="TextBox 4">
+            <a:extLst>
+              <a:ext uri="{FF2B5EF4-FFF2-40B4-BE49-F238E27FC236}">
+                <a16:creationId xmlns:a16="http://schemas.microsoft.com/office/drawing/2014/main" id="{B7FD566A-EF87-B50A-1906-3CFDBCA92ACB}"/>
+              </a:ext>
+            </a:extLst>
+          </p:cNvPr>
+          <p:cNvSpPr txBox="1"/>
+          <p:nvPr/>
+        </p:nvSpPr>
+        <p:spPr>
+          <a:xfrm>
+            <a:off x="3920770" y="1944105"/>
+            <a:ext cx="4572000" cy="923330"/>
+          </a:xfrm>
+          <a:prstGeom prst="rect">
+            <a:avLst/>
+          </a:prstGeom>
+          <a:noFill/>
+        </p:spPr>
+        <p:txBody>
+          <a:bodyPr wrap="square">
+            <a:spAutoFit/>
+          </a:bodyPr>
+          <a:lstStyle/>
+          <a:p>
+            <a:pPr algn="ctr"/>
+            <a:r>
+              <a:rPr lang="en-US" dirty="0"/>
+              <a:t>Show code for predict()</a:t>
+            </a:r>
+          </a:p>
+          <a:p>
+            <a:pPr algn="ctr"/>
+            <a:endParaRPr lang="en-US" dirty="0"/>
+          </a:p>
+          <a:p>
+            <a:pPr algn="ctr"/>
+            <a:r>
+              <a:rPr lang="en-US" dirty="0"/>
+              <a:t>Show predicted vs. observed</a:t>
+            </a:r>
+          </a:p>
+        </p:txBody>
+      </p:sp>
+    </p:spTree>
+    <p:extLst>
+      <p:ext uri="{BB962C8B-B14F-4D97-AF65-F5344CB8AC3E}">
+        <p14:creationId xmlns:p14="http://schemas.microsoft.com/office/powerpoint/2010/main" val="2362892396"/>
+      </p:ext>
+    </p:extLst>
+  </p:cSld>
+  <p:clrMapOvr>
+    <a:masterClrMapping/>
+  </p:clrMapOvr>
+</p:sld>
+</file>
+
+<file path=ppt/slides/slide63.xml><?xml version="1.0" encoding="utf-8"?>
+<p:sld xmlns:a="http://schemas.openxmlformats.org/drawingml/2006/main" xmlns:r="http://schemas.openxmlformats.org/officeDocument/2006/relationships" xmlns:p="http://schemas.openxmlformats.org/presentationml/2006/main">
+  <p:cSld>
+    <p:spTree>
+      <p:nvGrpSpPr>
+        <p:cNvPr id="1" name=""/>
+        <p:cNvGrpSpPr/>
+        <p:nvPr/>
+      </p:nvGrpSpPr>
+      <p:grpSpPr>
+        <a:xfrm>
+          <a:off x="0" y="0"/>
+          <a:ext cx="0" cy="0"/>
+          <a:chOff x="0" y="0"/>
+          <a:chExt cx="0" cy="0"/>
+        </a:xfrm>
+      </p:grpSpPr>
+      <p:sp>
+        <p:nvSpPr>
+          <p:cNvPr id="2" name="Title 1">
+            <a:extLst>
+              <a:ext uri="{FF2B5EF4-FFF2-40B4-BE49-F238E27FC236}">
+                <a16:creationId xmlns:a16="http://schemas.microsoft.com/office/drawing/2014/main" id="{B27191FA-B67F-312D-05C3-4420B3AAE319}"/>
+              </a:ext>
+            </a:extLst>
+          </p:cNvPr>
+          <p:cNvSpPr>
+            <a:spLocks noGrp="1"/>
+          </p:cNvSpPr>
+          <p:nvPr>
+            <p:ph type="title"/>
+          </p:nvPr>
+        </p:nvSpPr>
+        <p:spPr/>
+        <p:txBody>
+          <a:bodyPr/>
+          <a:lstStyle/>
+          <a:p>
+            <a:r>
+              <a:rPr lang="en-US" dirty="0"/>
+              <a:t>An example: predicting </a:t>
+            </a:r>
+            <a:r>
+              <a:rPr lang="en-US" i="1" dirty="0"/>
+              <a:t>m </a:t>
+            </a:r>
+            <a:r>
+              <a:rPr lang="en-US" dirty="0"/>
+              <a:t>and </a:t>
+            </a:r>
+            <a:r>
+              <a:rPr lang="en-US" i="1" dirty="0"/>
+              <a:t>v </a:t>
+            </a:r>
+            <a:r>
+              <a:rPr lang="en-US" dirty="0"/>
+              <a:t>from UNTB</a:t>
+            </a:r>
+          </a:p>
+        </p:txBody>
+      </p:sp>
+      <p:sp>
+        <p:nvSpPr>
+          <p:cNvPr id="3" name="TextBox 2">
+            <a:extLst>
+              <a:ext uri="{FF2B5EF4-FFF2-40B4-BE49-F238E27FC236}">
+                <a16:creationId xmlns:a16="http://schemas.microsoft.com/office/drawing/2014/main" id="{5A68FB74-FCF7-16B9-974F-12F2A5E405E7}"/>
+              </a:ext>
+            </a:extLst>
+          </p:cNvPr>
+          <p:cNvSpPr txBox="1"/>
+          <p:nvPr/>
+        </p:nvSpPr>
+        <p:spPr>
+          <a:xfrm>
+            <a:off x="651230" y="1205441"/>
+            <a:ext cx="2330095" cy="1477328"/>
+          </a:xfrm>
+          <a:prstGeom prst="rect">
+            <a:avLst/>
+          </a:prstGeom>
+          <a:noFill/>
+        </p:spPr>
+        <p:txBody>
+          <a:bodyPr wrap="square" rtlCol="0">
+            <a:spAutoFit/>
+          </a:bodyPr>
+          <a:lstStyle/>
+          <a:p>
+            <a:pPr algn="ctr"/>
+            <a:r>
+              <a:rPr lang="en-US" dirty="0"/>
+              <a:t>Use this model to estimate the </a:t>
+            </a:r>
+            <a:r>
+              <a:rPr lang="en-US" b="1" dirty="0"/>
+              <a:t>parameter values </a:t>
+            </a:r>
+            <a:r>
+              <a:rPr lang="en-US" dirty="0"/>
+              <a:t>that produced </a:t>
+            </a:r>
+            <a:r>
+              <a:rPr lang="en-US" b="1" dirty="0"/>
+              <a:t>observed outcomes</a:t>
+            </a:r>
+            <a:endParaRPr lang="en-US" dirty="0"/>
+          </a:p>
+        </p:txBody>
+      </p:sp>
+      <p:sp>
+        <p:nvSpPr>
+          <p:cNvPr id="5" name="TextBox 4">
+            <a:extLst>
+              <a:ext uri="{FF2B5EF4-FFF2-40B4-BE49-F238E27FC236}">
+                <a16:creationId xmlns:a16="http://schemas.microsoft.com/office/drawing/2014/main" id="{B7FD566A-EF87-B50A-1906-3CFDBCA92ACB}"/>
+              </a:ext>
+            </a:extLst>
+          </p:cNvPr>
+          <p:cNvSpPr txBox="1"/>
+          <p:nvPr/>
+        </p:nvSpPr>
+        <p:spPr>
+          <a:xfrm>
+            <a:off x="3920770" y="1944105"/>
+            <a:ext cx="4572000" cy="1754326"/>
+          </a:xfrm>
+          <a:prstGeom prst="rect">
+            <a:avLst/>
+          </a:prstGeom>
+          <a:noFill/>
+        </p:spPr>
+        <p:txBody>
+          <a:bodyPr wrap="square">
+            <a:spAutoFit/>
+          </a:bodyPr>
+          <a:lstStyle/>
+          <a:p>
+            <a:pPr algn="ctr"/>
+            <a:r>
+              <a:rPr lang="en-US" dirty="0"/>
+              <a:t>Show code for predict()</a:t>
+            </a:r>
+          </a:p>
+          <a:p>
+            <a:pPr algn="ctr"/>
+            <a:endParaRPr lang="en-US" dirty="0"/>
+          </a:p>
+          <a:p>
+            <a:pPr algn="ctr"/>
+            <a:r>
+              <a:rPr lang="en-US" dirty="0"/>
+              <a:t>Show predicted vs. observed</a:t>
+            </a:r>
+          </a:p>
+          <a:p>
+            <a:pPr algn="ctr"/>
+            <a:endParaRPr lang="en-US" dirty="0"/>
+          </a:p>
+          <a:p>
+            <a:pPr algn="ctr"/>
+            <a:r>
+              <a:rPr lang="en-US" dirty="0"/>
+              <a:t>Discuss model performance and poor prediction</a:t>
+            </a:r>
+          </a:p>
+        </p:txBody>
+      </p:sp>
+    </p:spTree>
+    <p:extLst>
+      <p:ext uri="{BB962C8B-B14F-4D97-AF65-F5344CB8AC3E}">
+        <p14:creationId xmlns:p14="http://schemas.microsoft.com/office/powerpoint/2010/main" val="461573154"/>
+      </p:ext>
+    </p:extLst>
+  </p:cSld>
+  <p:clrMapOvr>
+    <a:masterClrMapping/>
+  </p:clrMapOvr>
+</p:sld>
+</file>
+
+<file path=ppt/slides/slide64.xml><?xml version="1.0" encoding="utf-8"?>
+<p:sld xmlns:a="http://schemas.openxmlformats.org/drawingml/2006/main" xmlns:r="http://schemas.openxmlformats.org/officeDocument/2006/relationships" xmlns:p="http://schemas.openxmlformats.org/presentationml/2006/main">
+  <p:cSld>
+    <p:spTree>
+      <p:nvGrpSpPr>
+        <p:cNvPr id="1" name=""/>
+        <p:cNvGrpSpPr/>
+        <p:nvPr/>
+      </p:nvGrpSpPr>
+      <p:grpSpPr>
+        <a:xfrm>
+          <a:off x="0" y="0"/>
+          <a:ext cx="0" cy="0"/>
+          <a:chOff x="0" y="0"/>
+          <a:chExt cx="0" cy="0"/>
+        </a:xfrm>
+      </p:grpSpPr>
+      <p:sp>
+        <p:nvSpPr>
+          <p:cNvPr id="2" name="Title 1">
+            <a:extLst>
+              <a:ext uri="{FF2B5EF4-FFF2-40B4-BE49-F238E27FC236}">
+                <a16:creationId xmlns:a16="http://schemas.microsoft.com/office/drawing/2014/main" id="{B27191FA-B67F-312D-05C3-4420B3AAE319}"/>
+              </a:ext>
+            </a:extLst>
+          </p:cNvPr>
+          <p:cNvSpPr>
+            <a:spLocks noGrp="1"/>
+          </p:cNvSpPr>
+          <p:nvPr>
+            <p:ph type="title"/>
+          </p:nvPr>
+        </p:nvSpPr>
+        <p:spPr/>
+        <p:txBody>
+          <a:bodyPr/>
+          <a:lstStyle/>
+          <a:p>
+            <a:r>
+              <a:rPr lang="en-US" dirty="0"/>
+              <a:t>An example: predicting </a:t>
+            </a:r>
+            <a:r>
+              <a:rPr lang="en-US" i="1" dirty="0"/>
+              <a:t>m </a:t>
+            </a:r>
+            <a:r>
+              <a:rPr lang="en-US" dirty="0"/>
+              <a:t>and </a:t>
+            </a:r>
+            <a:r>
+              <a:rPr lang="en-US" i="1" dirty="0"/>
+              <a:t>v </a:t>
+            </a:r>
+            <a:r>
+              <a:rPr lang="en-US" dirty="0"/>
+              <a:t>from UNTB</a:t>
+            </a:r>
+          </a:p>
+        </p:txBody>
+      </p:sp>
+      <p:sp>
+        <p:nvSpPr>
+          <p:cNvPr id="3" name="TextBox 2">
+            <a:extLst>
+              <a:ext uri="{FF2B5EF4-FFF2-40B4-BE49-F238E27FC236}">
+                <a16:creationId xmlns:a16="http://schemas.microsoft.com/office/drawing/2014/main" id="{5A68FB74-FCF7-16B9-974F-12F2A5E405E7}"/>
+              </a:ext>
+            </a:extLst>
+          </p:cNvPr>
+          <p:cNvSpPr txBox="1"/>
+          <p:nvPr/>
+        </p:nvSpPr>
+        <p:spPr>
+          <a:xfrm>
+            <a:off x="651230" y="1205441"/>
+            <a:ext cx="2330095" cy="1477328"/>
+          </a:xfrm>
+          <a:prstGeom prst="rect">
+            <a:avLst/>
+          </a:prstGeom>
+          <a:noFill/>
+        </p:spPr>
+        <p:txBody>
+          <a:bodyPr wrap="square" rtlCol="0">
+            <a:spAutoFit/>
+          </a:bodyPr>
+          <a:lstStyle/>
+          <a:p>
+            <a:pPr algn="ctr"/>
+            <a:r>
+              <a:rPr lang="en-US" dirty="0"/>
+              <a:t>Use this model to estimate the </a:t>
+            </a:r>
+            <a:r>
+              <a:rPr lang="en-US" b="1" dirty="0"/>
+              <a:t>parameter values </a:t>
+            </a:r>
+            <a:r>
+              <a:rPr lang="en-US" dirty="0"/>
+              <a:t>that produced </a:t>
+            </a:r>
+            <a:r>
+              <a:rPr lang="en-US" b="1" dirty="0"/>
+              <a:t>observed outcomes</a:t>
+            </a:r>
+            <a:endParaRPr lang="en-US" dirty="0"/>
+          </a:p>
+        </p:txBody>
+      </p:sp>
+      <p:sp>
+        <p:nvSpPr>
+          <p:cNvPr id="5" name="TextBox 4">
+            <a:extLst>
+              <a:ext uri="{FF2B5EF4-FFF2-40B4-BE49-F238E27FC236}">
+                <a16:creationId xmlns:a16="http://schemas.microsoft.com/office/drawing/2014/main" id="{B7FD566A-EF87-B50A-1906-3CFDBCA92ACB}"/>
+              </a:ext>
+            </a:extLst>
+          </p:cNvPr>
+          <p:cNvSpPr txBox="1"/>
+          <p:nvPr/>
+        </p:nvSpPr>
+        <p:spPr>
+          <a:xfrm>
+            <a:off x="3920770" y="1944105"/>
+            <a:ext cx="4572000" cy="2308324"/>
+          </a:xfrm>
+          <a:prstGeom prst="rect">
+            <a:avLst/>
+          </a:prstGeom>
+          <a:noFill/>
+        </p:spPr>
+        <p:txBody>
+          <a:bodyPr wrap="square">
+            <a:spAutoFit/>
+          </a:bodyPr>
+          <a:lstStyle/>
+          <a:p>
+            <a:pPr algn="ctr"/>
+            <a:r>
+              <a:rPr lang="en-US" dirty="0"/>
+              <a:t>Show code for predict()</a:t>
+            </a:r>
+          </a:p>
+          <a:p>
+            <a:pPr algn="ctr"/>
+            <a:endParaRPr lang="en-US" dirty="0"/>
+          </a:p>
+          <a:p>
+            <a:pPr algn="ctr"/>
+            <a:r>
+              <a:rPr lang="en-US" dirty="0"/>
+              <a:t>Show predicted vs. observed</a:t>
+            </a:r>
+          </a:p>
+          <a:p>
+            <a:pPr algn="ctr"/>
+            <a:endParaRPr lang="en-US" dirty="0"/>
+          </a:p>
+          <a:p>
+            <a:pPr algn="ctr"/>
+            <a:r>
+              <a:rPr lang="en-US" dirty="0"/>
+              <a:t>Discuss model performance and poor prediction</a:t>
+            </a:r>
+          </a:p>
+          <a:p>
+            <a:pPr algn="ctr"/>
+            <a:endParaRPr lang="en-US" dirty="0"/>
+          </a:p>
+          <a:p>
+            <a:pPr algn="ctr"/>
+            <a:r>
+              <a:rPr lang="en-US" dirty="0"/>
+              <a:t>Brainstorm: how could we solve that?</a:t>
+            </a:r>
+          </a:p>
+        </p:txBody>
+      </p:sp>
+    </p:spTree>
+    <p:extLst>
+      <p:ext uri="{BB962C8B-B14F-4D97-AF65-F5344CB8AC3E}">
+        <p14:creationId xmlns:p14="http://schemas.microsoft.com/office/powerpoint/2010/main" val="1948254097"/>
+      </p:ext>
+    </p:extLst>
+  </p:cSld>
+  <p:clrMapOvr>
+    <a:masterClrMapping/>
+  </p:clrMapOvr>
+</p:sld>
+</file>
+
+<file path=ppt/slides/slide65.xml><?xml version="1.0" encoding="utf-8"?>
+<p:sld xmlns:a="http://schemas.openxmlformats.org/drawingml/2006/main" xmlns:r="http://schemas.openxmlformats.org/officeDocument/2006/relationships" xmlns:p="http://schemas.openxmlformats.org/presentationml/2006/main">
+  <p:cSld>
+    <p:spTree>
+      <p:nvGrpSpPr>
+        <p:cNvPr id="1" name=""/>
+        <p:cNvGrpSpPr/>
+        <p:nvPr/>
+      </p:nvGrpSpPr>
+      <p:grpSpPr>
+        <a:xfrm>
+          <a:off x="0" y="0"/>
+          <a:ext cx="0" cy="0"/>
+          <a:chOff x="0" y="0"/>
+          <a:chExt cx="0" cy="0"/>
+        </a:xfrm>
+      </p:grpSpPr>
+      <p:sp>
+        <p:nvSpPr>
+          <p:cNvPr id="2" name="Title 1">
+            <a:extLst>
+              <a:ext uri="{FF2B5EF4-FFF2-40B4-BE49-F238E27FC236}">
+                <a16:creationId xmlns:a16="http://schemas.microsoft.com/office/drawing/2014/main" id="{9BCCB19C-1B36-B38B-6458-20A77AD673EC}"/>
+              </a:ext>
+            </a:extLst>
+          </p:cNvPr>
+          <p:cNvSpPr>
+            <a:spLocks noGrp="1"/>
+          </p:cNvSpPr>
+          <p:nvPr>
+            <p:ph type="title"/>
+          </p:nvPr>
+        </p:nvSpPr>
+        <p:spPr/>
+        <p:txBody>
+          <a:bodyPr/>
+          <a:lstStyle/>
+          <a:p>
+            <a:r>
+              <a:rPr lang="en-US" dirty="0"/>
+              <a:t>Recap</a:t>
+            </a:r>
+          </a:p>
+        </p:txBody>
+      </p:sp>
+      <p:sp>
+        <p:nvSpPr>
+          <p:cNvPr id="3" name="Content Placeholder 2">
+            <a:extLst>
+              <a:ext uri="{FF2B5EF4-FFF2-40B4-BE49-F238E27FC236}">
+                <a16:creationId xmlns:a16="http://schemas.microsoft.com/office/drawing/2014/main" id="{A7633275-0F62-AC4C-2A80-E1FF4BD05E85}"/>
+              </a:ext>
+            </a:extLst>
+          </p:cNvPr>
+          <p:cNvSpPr>
+            <a:spLocks noGrp="1"/>
+          </p:cNvSpPr>
+          <p:nvPr>
+            <p:ph idx="1"/>
+          </p:nvPr>
+        </p:nvSpPr>
+        <p:spPr>
+          <a:xfrm>
+            <a:off x="457200" y="1200151"/>
+            <a:ext cx="7606145" cy="3399558"/>
+          </a:xfrm>
+        </p:spPr>
+        <p:txBody>
+          <a:bodyPr/>
+          <a:lstStyle/>
+          <a:p>
+            <a:r>
+              <a:rPr lang="en-US" dirty="0"/>
+              <a:t>In principle, we can use process models to infer the parameters that generate observed data</a:t>
+            </a:r>
+          </a:p>
+          <a:p>
+            <a:r>
+              <a:rPr lang="en-US" dirty="0"/>
+              <a:t>This is complicated by:</a:t>
+            </a:r>
+          </a:p>
+          <a:p>
+            <a:pPr lvl="1"/>
+            <a:r>
+              <a:rPr lang="en-US" dirty="0"/>
+              <a:t>Out-of-sample prediction</a:t>
+            </a:r>
+          </a:p>
+          <a:p>
+            <a:pPr lvl="1"/>
+            <a:r>
+              <a:rPr lang="en-US" dirty="0"/>
+              <a:t>Model identifiability</a:t>
+            </a:r>
+          </a:p>
+          <a:p>
+            <a:pPr lvl="1"/>
+            <a:r>
+              <a:rPr lang="en-US" dirty="0"/>
+              <a:t>Model run time</a:t>
+            </a:r>
+          </a:p>
+          <a:p>
+            <a:pPr lvl="1"/>
+            <a:r>
+              <a:rPr lang="en-US" dirty="0"/>
+              <a:t>The underlying validity of the process model</a:t>
+            </a:r>
+          </a:p>
+        </p:txBody>
+      </p:sp>
+    </p:spTree>
+    <p:extLst>
+      <p:ext uri="{BB962C8B-B14F-4D97-AF65-F5344CB8AC3E}">
+        <p14:creationId xmlns:p14="http://schemas.microsoft.com/office/powerpoint/2010/main" val="3332556"/>
+      </p:ext>
+    </p:extLst>
+  </p:cSld>
+  <p:clrMapOvr>
+    <a:masterClrMapping/>
+  </p:clrMapOvr>
+</p:sld>
+</file>
+
+<file path=ppt/slides/slide66.xml><?xml version="1.0" encoding="utf-8"?>
+<p:sld xmlns:a="http://schemas.openxmlformats.org/drawingml/2006/main" xmlns:r="http://schemas.openxmlformats.org/officeDocument/2006/relationships" xmlns:p="http://schemas.openxmlformats.org/presentationml/2006/main">
+  <p:cSld>
+    <p:spTree>
+      <p:nvGrpSpPr>
+        <p:cNvPr id="1" name=""/>
+        <p:cNvGrpSpPr/>
+        <p:nvPr/>
+      </p:nvGrpSpPr>
+      <p:grpSpPr>
+        <a:xfrm>
+          <a:off x="0" y="0"/>
+          <a:ext cx="0" cy="0"/>
+          <a:chOff x="0" y="0"/>
+          <a:chExt cx="0" cy="0"/>
+        </a:xfrm>
+      </p:grpSpPr>
+      <p:sp>
+        <p:nvSpPr>
+          <p:cNvPr id="2" name="Title 1">
+            <a:extLst>
+              <a:ext uri="{FF2B5EF4-FFF2-40B4-BE49-F238E27FC236}">
+                <a16:creationId xmlns:a16="http://schemas.microsoft.com/office/drawing/2014/main" id="{CDFF813E-B1A4-9BF3-4C82-7D736C5EDA6D}"/>
+              </a:ext>
+            </a:extLst>
+          </p:cNvPr>
+          <p:cNvSpPr>
+            <a:spLocks noGrp="1"/>
+          </p:cNvSpPr>
+          <p:nvPr>
+            <p:ph type="title"/>
+          </p:nvPr>
+        </p:nvSpPr>
+        <p:spPr/>
+        <p:txBody>
+          <a:bodyPr/>
+          <a:lstStyle/>
+          <a:p>
+            <a:r>
+              <a:rPr lang="en-US" dirty="0"/>
+              <a:t>Looking ahead…</a:t>
+            </a:r>
+          </a:p>
+        </p:txBody>
+      </p:sp>
+      <p:sp>
+        <p:nvSpPr>
+          <p:cNvPr id="3" name="Content Placeholder 2">
+            <a:extLst>
+              <a:ext uri="{FF2B5EF4-FFF2-40B4-BE49-F238E27FC236}">
+                <a16:creationId xmlns:a16="http://schemas.microsoft.com/office/drawing/2014/main" id="{4995731C-C0E1-AB09-4D7D-2723EBC6DABC}"/>
+              </a:ext>
+            </a:extLst>
+          </p:cNvPr>
+          <p:cNvSpPr>
+            <a:spLocks noGrp="1"/>
+          </p:cNvSpPr>
+          <p:nvPr>
+            <p:ph idx="1"/>
+          </p:nvPr>
+        </p:nvSpPr>
+        <p:spPr/>
+        <p:txBody>
+          <a:bodyPr>
+            <a:normAutofit/>
+          </a:bodyPr>
+          <a:lstStyle/>
+          <a:p>
+            <a:pPr marL="0" indent="0" algn="ctr">
+              <a:buNone/>
+            </a:pPr>
+            <a:endParaRPr lang="en-US" sz="2800" dirty="0"/>
+          </a:p>
+          <a:p>
+            <a:pPr marL="0" indent="0" algn="ctr">
+              <a:buNone/>
+            </a:pPr>
+            <a:endParaRPr lang="en-US" sz="2800" dirty="0"/>
+          </a:p>
+          <a:p>
+            <a:pPr marL="0" indent="0" algn="ctr">
+              <a:buNone/>
+            </a:pPr>
+            <a:r>
+              <a:rPr lang="en-US" sz="2800" b="1" dirty="0"/>
+              <a:t>Flexible</a:t>
+            </a:r>
+            <a:r>
+              <a:rPr lang="en-US" sz="2800" dirty="0"/>
+              <a:t>, </a:t>
+            </a:r>
+            <a:r>
+              <a:rPr lang="en-US" sz="2800" b="1" dirty="0"/>
+              <a:t>scalable</a:t>
+            </a:r>
+            <a:r>
+              <a:rPr lang="en-US" sz="2800" dirty="0"/>
+              <a:t>, </a:t>
+            </a:r>
+            <a:r>
+              <a:rPr lang="en-US" sz="2800" b="1" dirty="0"/>
+              <a:t>multidimensional</a:t>
+            </a:r>
+            <a:r>
+              <a:rPr lang="en-US" sz="2800" dirty="0"/>
+              <a:t>, and generally much </a:t>
+            </a:r>
+            <a:r>
+              <a:rPr lang="en-US" sz="2800" b="1" dirty="0"/>
+              <a:t>mess-</a:t>
+            </a:r>
+            <a:r>
+              <a:rPr lang="en-US" sz="2800" dirty="0" err="1"/>
+              <a:t>ier</a:t>
+            </a:r>
+            <a:r>
+              <a:rPr lang="en-US" sz="2800" dirty="0"/>
+              <a:t> and more powerful models!</a:t>
+            </a:r>
+          </a:p>
+        </p:txBody>
+      </p:sp>
+    </p:spTree>
+    <p:extLst>
+      <p:ext uri="{BB962C8B-B14F-4D97-AF65-F5344CB8AC3E}">
+        <p14:creationId xmlns:p14="http://schemas.microsoft.com/office/powerpoint/2010/main" val="2985637486"/>
+      </p:ext>
+    </p:extLst>
+  </p:cSld>
+  <p:clrMapOvr>
+    <a:masterClrMapping/>
+  </p:clrMapOvr>
+</p:sld>
+</file>
+
+<file path=ppt/slides/slide67.xml><?xml version="1.0" encoding="utf-8"?>
+<p:sld xmlns:a="http://schemas.openxmlformats.org/drawingml/2006/main" xmlns:r="http://schemas.openxmlformats.org/officeDocument/2006/relationships" xmlns:p="http://schemas.openxmlformats.org/presentationml/2006/main">
+  <p:cSld>
+    <p:spTree>
+      <p:nvGrpSpPr>
+        <p:cNvPr id="1" name=""/>
+        <p:cNvGrpSpPr/>
+        <p:nvPr/>
+      </p:nvGrpSpPr>
+      <p:grpSpPr>
+        <a:xfrm>
+          <a:off x="0" y="0"/>
+          <a:ext cx="0" cy="0"/>
+          <a:chOff x="0" y="0"/>
+          <a:chExt cx="0" cy="0"/>
+        </a:xfrm>
+      </p:grpSpPr>
+      <p:sp>
+        <p:nvSpPr>
+          <p:cNvPr id="2" name="Title 1">
+            <a:extLst>
+              <a:ext uri="{FF2B5EF4-FFF2-40B4-BE49-F238E27FC236}">
+                <a16:creationId xmlns:a16="http://schemas.microsoft.com/office/drawing/2014/main" id="{CEB9EC4E-8B53-44C6-07FC-2C396D086998}"/>
+              </a:ext>
+            </a:extLst>
+          </p:cNvPr>
+          <p:cNvSpPr>
+            <a:spLocks noGrp="1"/>
+          </p:cNvSpPr>
+          <p:nvPr>
+            <p:ph type="title"/>
+          </p:nvPr>
+        </p:nvSpPr>
+        <p:spPr/>
+        <p:txBody>
+          <a:bodyPr/>
+          <a:lstStyle/>
+          <a:p>
+            <a:endParaRPr lang="en-US"/>
+          </a:p>
+        </p:txBody>
+      </p:sp>
+      <p:sp>
+        <p:nvSpPr>
+          <p:cNvPr id="3" name="Content Placeholder 2">
+            <a:extLst>
+              <a:ext uri="{FF2B5EF4-FFF2-40B4-BE49-F238E27FC236}">
+                <a16:creationId xmlns:a16="http://schemas.microsoft.com/office/drawing/2014/main" id="{AC984FFE-0604-9EFE-D108-391894BBB040}"/>
+              </a:ext>
+            </a:extLst>
+          </p:cNvPr>
+          <p:cNvSpPr>
+            <a:spLocks noGrp="1"/>
+          </p:cNvSpPr>
+          <p:nvPr>
+            <p:ph idx="1"/>
+          </p:nvPr>
+        </p:nvSpPr>
+        <p:spPr/>
+        <p:txBody>
+          <a:bodyPr/>
+          <a:lstStyle/>
+          <a:p>
+            <a:endParaRPr lang="en-US"/>
+          </a:p>
+        </p:txBody>
+      </p:sp>
+    </p:spTree>
+    <p:extLst>
+      <p:ext uri="{BB962C8B-B14F-4D97-AF65-F5344CB8AC3E}">
+        <p14:creationId xmlns:p14="http://schemas.microsoft.com/office/powerpoint/2010/main" val="3116212724"/>
       </p:ext>
     </p:extLst>
   </p:cSld>

</xml_diff>